<commit_message>
Saját rész megvan, pár javítás
</commit_message>
<xml_diff>
--- a/Prezentáció.pptx
+++ b/Prezentáció.pptx
@@ -33,30 +33,23 @@
   <p:notesSz cx="6858000" cy="9144000"/>
   <p:embeddedFontLst>
     <p:embeddedFont>
-      <p:font typeface="Poppins" panose="020B0604020202020204" charset="-18"/>
+      <p:font typeface="Poppins" panose="00000500000000000000" pitchFamily="2" charset="-18"/>
       <p:regular r:id="rId23"/>
       <p:bold r:id="rId24"/>
       <p:italic r:id="rId25"/>
       <p:boldItalic r:id="rId26"/>
     </p:embeddedFont>
     <p:embeddedFont>
-      <p:font typeface="Poppins Black" panose="020B0604020202020204" charset="-18"/>
+      <p:font typeface="Poppins Black" panose="00000A00000000000000" pitchFamily="2" charset="-18"/>
       <p:bold r:id="rId27"/>
       <p:boldItalic r:id="rId28"/>
     </p:embeddedFont>
     <p:embeddedFont>
-      <p:font typeface="Poppins Medium" panose="020B0604020202020204" charset="-18"/>
+      <p:font typeface="Poppins Medium" panose="00000600000000000000" pitchFamily="2" charset="-18"/>
       <p:regular r:id="rId29"/>
       <p:bold r:id="rId30"/>
       <p:italic r:id="rId31"/>
       <p:boldItalic r:id="rId32"/>
-    </p:embeddedFont>
-    <p:embeddedFont>
-      <p:font typeface="Verdana" panose="020B0604030504040204" pitchFamily="34" charset="0"/>
-      <p:regular r:id="rId33"/>
-      <p:bold r:id="rId34"/>
-      <p:italic r:id="rId35"/>
-      <p:boldItalic r:id="rId36"/>
     </p:embeddedFont>
   </p:embeddedFontLst>
   <p:defaultTextStyle>
@@ -851,7 +844,7 @@
             </a:r>
             <a:r>
               <a:rPr lang="hu-HU" dirty="0"/>
-              <a:t> Matyi: Miről fogunk beszéni?</a:t>
+              <a:t>: Miről fogunk beszélni?</a:t>
             </a:r>
             <a:endParaRPr dirty="0"/>
           </a:p>
@@ -957,18 +950,6 @@
               </a:spcAft>
               <a:buNone/>
             </a:pPr>
-            <a:r>
-              <a:rPr lang="hu-HU" dirty="0" err="1"/>
-              <a:t>Köv</a:t>
-            </a:r>
-            <a:r>
-              <a:rPr lang="hu-HU" dirty="0"/>
-              <a:t> Peti: </a:t>
-            </a:r>
-            <a:r>
-              <a:rPr lang="hu-HU" dirty="0" err="1"/>
-              <a:t>Carousel</a:t>
-            </a:r>
             <a:endParaRPr dirty="0"/>
           </a:p>
         </p:txBody>
@@ -1079,11 +1060,7 @@
             </a:r>
             <a:r>
               <a:rPr lang="hu-HU" dirty="0"/>
-              <a:t> Peti: </a:t>
-            </a:r>
-            <a:r>
-              <a:rPr lang="hu-HU" dirty="0" err="1"/>
-              <a:t>Carousel</a:t>
+              <a:t>: reflex</a:t>
             </a:r>
             <a:endParaRPr dirty="0"/>
           </a:p>
@@ -1189,18 +1166,6 @@
               </a:spcAft>
               <a:buNone/>
             </a:pPr>
-            <a:r>
-              <a:rPr lang="hu-HU" dirty="0" err="1"/>
-              <a:t>Köv</a:t>
-            </a:r>
-            <a:r>
-              <a:rPr lang="hu-HU" dirty="0"/>
-              <a:t> Peti: </a:t>
-            </a:r>
-            <a:r>
-              <a:rPr lang="hu-HU" dirty="0" err="1"/>
-              <a:t>Carousel</a:t>
-            </a:r>
             <a:endParaRPr dirty="0"/>
           </a:p>
         </p:txBody>
@@ -1311,11 +1276,11 @@
             </a:r>
             <a:r>
               <a:rPr lang="hu-HU" dirty="0"/>
-              <a:t> Peti: </a:t>
+              <a:t>: Bella </a:t>
             </a:r>
             <a:r>
               <a:rPr lang="hu-HU" dirty="0" err="1"/>
-              <a:t>Carousel</a:t>
+              <a:t>quiz</a:t>
             </a:r>
             <a:endParaRPr dirty="0"/>
           </a:p>
@@ -1532,7 +1497,7 @@
             </a:pPr>
             <a:r>
               <a:rPr lang="hu-HU" dirty="0"/>
-              <a:t>4 nagyobb kép</a:t>
+              <a:t>8 kép</a:t>
             </a:r>
             <a:endParaRPr dirty="0"/>
           </a:p>
@@ -1645,20 +1610,8 @@
             </a:pPr>
             <a:r>
               <a:rPr lang="hu-HU" dirty="0"/>
-              <a:t>3 nagyobb kép</a:t>
+              <a:t>2 kép és 2 funkciókép</a:t>
             </a:r>
-          </a:p>
-          <a:p>
-            <a:pPr marL="0" lvl="0" indent="0" algn="l" rtl="0">
-              <a:spcBef>
-                <a:spcPts val="0"/>
-              </a:spcBef>
-              <a:spcAft>
-                <a:spcPts val="0"/>
-              </a:spcAft>
-              <a:buNone/>
-            </a:pPr>
-            <a:endParaRPr lang="hu-HU" dirty="0"/>
           </a:p>
           <a:p>
             <a:pPr marL="0" lvl="0" indent="0" algn="l" rtl="0">
@@ -2153,7 +2106,7 @@
               </a:spcAft>
               <a:buNone/>
             </a:pPr>
-            <a:endParaRPr/>
+            <a:endParaRPr dirty="0"/>
           </a:p>
         </p:txBody>
       </p:sp>
@@ -2380,7 +2333,7 @@
             </a:r>
             <a:r>
               <a:rPr lang="hu-HU" dirty="0"/>
-              <a:t> Matyi: Technológiák</a:t>
+              <a:t>: Technológiák</a:t>
             </a:r>
             <a:endParaRPr dirty="0"/>
           </a:p>
@@ -2601,7 +2554,7 @@
             </a:r>
             <a:r>
               <a:rPr lang="hu-HU" dirty="0"/>
-              <a:t> Peti: Menürendszer</a:t>
+              <a:t>: Informatív és kezdő oldal</a:t>
             </a:r>
             <a:endParaRPr dirty="0"/>
           </a:p>
@@ -2824,6 +2777,25 @@
             <a:r>
               <a:rPr lang="hu-HU" dirty="0"/>
               <a:t>2 nagyobb kép</a:t>
+            </a:r>
+          </a:p>
+          <a:p>
+            <a:pPr marL="0" lvl="0" indent="0" algn="l" rtl="0">
+              <a:spcBef>
+                <a:spcPts val="0"/>
+              </a:spcBef>
+              <a:spcAft>
+                <a:spcPts val="0"/>
+              </a:spcAft>
+              <a:buNone/>
+            </a:pPr>
+            <a:r>
+              <a:rPr lang="hu-HU" dirty="0" err="1"/>
+              <a:t>Köv</a:t>
+            </a:r>
+            <a:r>
+              <a:rPr lang="hu-HU" dirty="0"/>
+              <a:t>: Játékok</a:t>
             </a:r>
           </a:p>
           <a:p>
@@ -2973,7 +2945,15 @@
               </a:spcAft>
               <a:buNone/>
             </a:pPr>
-            <a:endParaRPr/>
+            <a:r>
+              <a:rPr lang="hu-HU" dirty="0" err="1"/>
+              <a:t>Köv</a:t>
+            </a:r>
+            <a:r>
+              <a:rPr lang="hu-HU" dirty="0"/>
+              <a:t>: Kávékereső</a:t>
+            </a:r>
+            <a:endParaRPr dirty="0"/>
           </a:p>
         </p:txBody>
       </p:sp>
@@ -10963,8 +10943,8 @@
         </p:nvSpPr>
         <p:spPr>
           <a:xfrm>
-            <a:off x="4948752" y="3697548"/>
-            <a:ext cx="2745300" cy="817301"/>
+            <a:off x="5609200" y="3864508"/>
+            <a:ext cx="1512118" cy="530201"/>
           </a:xfrm>
           <a:prstGeom prst="rect">
             <a:avLst/>
@@ -10979,15 +10959,13 @@
           </a:bodyPr>
           <a:lstStyle/>
           <a:p>
-            <a:pPr marL="285750" lvl="0" indent="-285750" algn="l" rtl="0">
-              <a:spcBef>
-                <a:spcPts val="0"/>
-              </a:spcBef>
-              <a:spcAft>
-                <a:spcPts val="0"/>
-              </a:spcAft>
-              <a:buFont typeface="Arial" panose="020B0604020202020204" pitchFamily="34" charset="0"/>
-              <a:buChar char="•"/>
+            <a:pPr marL="0" lvl="0" indent="0" rtl="0">
+              <a:spcBef>
+                <a:spcPts val="0"/>
+              </a:spcBef>
+              <a:spcAft>
+                <a:spcPts val="0"/>
+              </a:spcAft>
             </a:pPr>
             <a:r>
               <a:rPr lang="hu-HU" dirty="0"/>
@@ -10995,15 +10973,13 @@
             </a:r>
           </a:p>
           <a:p>
-            <a:pPr marL="285750" lvl="0" indent="-285750" algn="l" rtl="0">
-              <a:spcBef>
-                <a:spcPts val="0"/>
-              </a:spcBef>
-              <a:spcAft>
-                <a:spcPts val="0"/>
-              </a:spcAft>
-              <a:buFont typeface="Arial" panose="020B0604020202020204" pitchFamily="34" charset="0"/>
-              <a:buChar char="•"/>
+            <a:pPr marL="0" lvl="0" indent="0" rtl="0">
+              <a:spcBef>
+                <a:spcPts val="0"/>
+              </a:spcBef>
+              <a:spcAft>
+                <a:spcPts val="0"/>
+              </a:spcAft>
             </a:pPr>
             <a:r>
               <a:rPr lang="hu-HU" dirty="0"/>
@@ -11011,15 +10987,13 @@
             </a:r>
           </a:p>
           <a:p>
-            <a:pPr marL="285750" lvl="0" indent="-285750" algn="l" rtl="0">
-              <a:spcBef>
-                <a:spcPts val="0"/>
-              </a:spcBef>
-              <a:spcAft>
-                <a:spcPts val="0"/>
-              </a:spcAft>
-              <a:buFont typeface="Arial" panose="020B0604020202020204" pitchFamily="34" charset="0"/>
-              <a:buChar char="•"/>
+            <a:pPr marL="0" lvl="0" indent="0" rtl="0">
+              <a:spcBef>
+                <a:spcPts val="0"/>
+              </a:spcBef>
+              <a:spcAft>
+                <a:spcPts val="0"/>
+              </a:spcAft>
             </a:pPr>
             <a:r>
               <a:rPr lang="hu-HU" dirty="0"/>
@@ -11446,10 +11420,10 @@
       </p:cxnSp>
       <p:pic>
         <p:nvPicPr>
-          <p:cNvPr id="5" name="Kép 4">
+          <p:cNvPr id="8" name="Kép 7">
             <a:extLst>
               <a:ext uri="{FF2B5EF4-FFF2-40B4-BE49-F238E27FC236}">
-                <a16:creationId xmlns:a16="http://schemas.microsoft.com/office/drawing/2014/main" id="{6F9AB724-1F9B-24CD-90FA-CE143DE5337F}"/>
+                <a16:creationId xmlns:a16="http://schemas.microsoft.com/office/drawing/2014/main" id="{A1618673-F89D-C381-9DE1-4D217B791870}"/>
               </a:ext>
             </a:extLst>
           </p:cNvPr>
@@ -11466,27 +11440,20 @@
         </p:blipFill>
         <p:spPr>
           <a:xfrm>
-            <a:off x="4189142" y="843545"/>
-            <a:ext cx="4515592" cy="1643974"/>
+            <a:off x="3408198" y="1136225"/>
+            <a:ext cx="2732909" cy="1093163"/>
           </a:xfrm>
           <a:prstGeom prst="rect">
             <a:avLst/>
           </a:prstGeom>
-          <a:ln w="12700">
-            <a:solidFill>
-              <a:srgbClr val="FFFFFF">
-                <a:alpha val="20000"/>
-              </a:srgbClr>
-            </a:solidFill>
-          </a:ln>
         </p:spPr>
       </p:pic>
       <p:pic>
         <p:nvPicPr>
-          <p:cNvPr id="9" name="Kép 8">
+          <p:cNvPr id="12" name="Kép 11">
             <a:extLst>
               <a:ext uri="{FF2B5EF4-FFF2-40B4-BE49-F238E27FC236}">
-                <a16:creationId xmlns:a16="http://schemas.microsoft.com/office/drawing/2014/main" id="{EFFFA122-CAE3-F27C-08C4-F8480FA8F148}"/>
+                <a16:creationId xmlns:a16="http://schemas.microsoft.com/office/drawing/2014/main" id="{534FABCD-F426-7C63-FD66-5B991139B82A}"/>
               </a:ext>
             </a:extLst>
           </p:cNvPr>
@@ -11497,33 +11464,25 @@
         </p:nvPicPr>
         <p:blipFill>
           <a:blip r:embed="rId4"/>
-          <a:stretch>
-            <a:fillRect/>
-          </a:stretch>
+          <a:srcRect/>
+          <a:stretch/>
         </p:blipFill>
         <p:spPr>
           <a:xfrm>
-            <a:off x="817151" y="2559782"/>
-            <a:ext cx="2372351" cy="2183403"/>
+            <a:off x="203635" y="2302330"/>
+            <a:ext cx="3814146" cy="2389216"/>
           </a:xfrm>
           <a:prstGeom prst="rect">
             <a:avLst/>
           </a:prstGeom>
-          <a:ln w="12700">
-            <a:solidFill>
-              <a:srgbClr val="FFFFFF">
-                <a:alpha val="20000"/>
-              </a:srgbClr>
-            </a:solidFill>
-          </a:ln>
         </p:spPr>
       </p:pic>
       <p:pic>
         <p:nvPicPr>
-          <p:cNvPr id="11" name="Kép 10">
+          <p:cNvPr id="15" name="Kép 14">
             <a:extLst>
               <a:ext uri="{FF2B5EF4-FFF2-40B4-BE49-F238E27FC236}">
-                <a16:creationId xmlns:a16="http://schemas.microsoft.com/office/drawing/2014/main" id="{28A21266-A17A-3D27-4412-4AB2ADA24779}"/>
+                <a16:creationId xmlns:a16="http://schemas.microsoft.com/office/drawing/2014/main" id="{CD6ADC86-0668-8373-7E2E-1CFB7E9D6C9E}"/>
               </a:ext>
             </a:extLst>
           </p:cNvPr>
@@ -11540,27 +11499,20 @@
         </p:blipFill>
         <p:spPr>
           <a:xfrm>
-            <a:off x="3292987" y="2557315"/>
-            <a:ext cx="2255496" cy="2183403"/>
+            <a:off x="3390159" y="910482"/>
+            <a:ext cx="4877481" cy="1352739"/>
           </a:xfrm>
           <a:prstGeom prst="rect">
             <a:avLst/>
           </a:prstGeom>
-          <a:ln w="12700">
-            <a:solidFill>
-              <a:srgbClr val="FFFFFF">
-                <a:alpha val="20000"/>
-              </a:srgbClr>
-            </a:solidFill>
-          </a:ln>
         </p:spPr>
       </p:pic>
       <p:pic>
         <p:nvPicPr>
-          <p:cNvPr id="13" name="Kép 12">
+          <p:cNvPr id="17" name="Kép 16">
             <a:extLst>
               <a:ext uri="{FF2B5EF4-FFF2-40B4-BE49-F238E27FC236}">
-                <a16:creationId xmlns:a16="http://schemas.microsoft.com/office/drawing/2014/main" id="{3AF4F2B1-EEF2-0E28-F002-13D9286A6AE0}"/>
+                <a16:creationId xmlns:a16="http://schemas.microsoft.com/office/drawing/2014/main" id="{3BAF281B-73FF-C286-84A0-2380B66F08B5}"/>
               </a:ext>
             </a:extLst>
           </p:cNvPr>
@@ -11577,27 +11529,20 @@
         </p:blipFill>
         <p:spPr>
           <a:xfrm>
-            <a:off x="5657061" y="2557315"/>
-            <a:ext cx="3047673" cy="1622711"/>
+            <a:off x="4078317" y="1314867"/>
+            <a:ext cx="4734226" cy="3376679"/>
           </a:xfrm>
           <a:prstGeom prst="rect">
             <a:avLst/>
           </a:prstGeom>
-          <a:ln w="12700">
-            <a:solidFill>
-              <a:srgbClr val="FFFFFF">
-                <a:alpha val="20000"/>
-              </a:srgbClr>
-            </a:solidFill>
-          </a:ln>
         </p:spPr>
       </p:pic>
       <p:pic>
         <p:nvPicPr>
-          <p:cNvPr id="2" name="Kép 1">
+          <p:cNvPr id="21" name="Kép 20">
             <a:extLst>
               <a:ext uri="{FF2B5EF4-FFF2-40B4-BE49-F238E27FC236}">
-                <a16:creationId xmlns:a16="http://schemas.microsoft.com/office/drawing/2014/main" id="{E20D5E8E-E133-C03D-CE38-457C42EBE7E5}"/>
+                <a16:creationId xmlns:a16="http://schemas.microsoft.com/office/drawing/2014/main" id="{00608E4C-F6F8-424F-A9AF-9E5B718F3FA2}"/>
               </a:ext>
             </a:extLst>
           </p:cNvPr>
@@ -11607,34 +11552,27 @@
           <p:nvPr/>
         </p:nvPicPr>
         <p:blipFill>
-          <a:blip r:embed="rId3"/>
+          <a:blip r:embed="rId7"/>
           <a:stretch>
             <a:fillRect/>
           </a:stretch>
         </p:blipFill>
         <p:spPr>
           <a:xfrm>
-            <a:off x="-3872" y="905830"/>
-            <a:ext cx="9147872" cy="3330430"/>
+            <a:off x="3390159" y="1076280"/>
+            <a:ext cx="4650614" cy="1131230"/>
           </a:xfrm>
           <a:prstGeom prst="rect">
             <a:avLst/>
           </a:prstGeom>
-          <a:ln w="12700">
-            <a:solidFill>
-              <a:srgbClr val="FFFFFF">
-                <a:alpha val="20000"/>
-              </a:srgbClr>
-            </a:solidFill>
-          </a:ln>
         </p:spPr>
       </p:pic>
       <p:pic>
         <p:nvPicPr>
-          <p:cNvPr id="3" name="Kép 2">
+          <p:cNvPr id="23" name="Kép 22">
             <a:extLst>
               <a:ext uri="{FF2B5EF4-FFF2-40B4-BE49-F238E27FC236}">
-                <a16:creationId xmlns:a16="http://schemas.microsoft.com/office/drawing/2014/main" id="{D830E204-1B58-296A-8CDB-3B68ACCD752F}"/>
+                <a16:creationId xmlns:a16="http://schemas.microsoft.com/office/drawing/2014/main" id="{1FB0C8EC-490B-7581-3245-BD583F56184A}"/>
               </a:ext>
             </a:extLst>
           </p:cNvPr>
@@ -11644,34 +11582,27 @@
           <p:nvPr/>
         </p:nvPicPr>
         <p:blipFill>
-          <a:blip r:embed="rId4"/>
+          <a:blip r:embed="rId8"/>
           <a:stretch>
             <a:fillRect/>
           </a:stretch>
         </p:blipFill>
         <p:spPr>
           <a:xfrm>
-            <a:off x="1743740" y="-9206"/>
-            <a:ext cx="5629917" cy="5181517"/>
+            <a:off x="140737" y="2642151"/>
+            <a:ext cx="3896347" cy="1590867"/>
           </a:xfrm>
           <a:prstGeom prst="rect">
             <a:avLst/>
           </a:prstGeom>
-          <a:ln w="12700">
-            <a:solidFill>
-              <a:srgbClr val="FFFFFF">
-                <a:alpha val="20000"/>
-              </a:srgbClr>
-            </a:solidFill>
-          </a:ln>
         </p:spPr>
       </p:pic>
       <p:pic>
         <p:nvPicPr>
-          <p:cNvPr id="4" name="Kép 3">
+          <p:cNvPr id="25" name="Kép 24">
             <a:extLst>
               <a:ext uri="{FF2B5EF4-FFF2-40B4-BE49-F238E27FC236}">
-                <a16:creationId xmlns:a16="http://schemas.microsoft.com/office/drawing/2014/main" id="{B76ABCA8-07C3-5692-2426-0E0373E19BCA}"/>
+                <a16:creationId xmlns:a16="http://schemas.microsoft.com/office/drawing/2014/main" id="{ADC03A7A-0549-BEAE-53C6-1D9B0CFD5180}"/>
               </a:ext>
             </a:extLst>
           </p:cNvPr>
@@ -11681,34 +11612,27 @@
           <p:nvPr/>
         </p:nvPicPr>
         <p:blipFill>
-          <a:blip r:embed="rId5"/>
+          <a:blip r:embed="rId9"/>
           <a:stretch>
             <a:fillRect/>
           </a:stretch>
         </p:blipFill>
         <p:spPr>
           <a:xfrm>
-            <a:off x="1886897" y="-5299"/>
-            <a:ext cx="5362459" cy="5191058"/>
+            <a:off x="4483495" y="2501808"/>
+            <a:ext cx="3990082" cy="1859710"/>
           </a:xfrm>
           <a:prstGeom prst="rect">
             <a:avLst/>
           </a:prstGeom>
-          <a:ln w="12700">
-            <a:solidFill>
-              <a:srgbClr val="FFFFFF">
-                <a:alpha val="20000"/>
-              </a:srgbClr>
-            </a:solidFill>
-          </a:ln>
         </p:spPr>
       </p:pic>
       <p:pic>
         <p:nvPicPr>
-          <p:cNvPr id="6" name="Kép 5">
+          <p:cNvPr id="27" name="Kép 26">
             <a:extLst>
               <a:ext uri="{FF2B5EF4-FFF2-40B4-BE49-F238E27FC236}">
-                <a16:creationId xmlns:a16="http://schemas.microsoft.com/office/drawing/2014/main" id="{FADDE996-F453-139D-4C09-8B319FDBB1CD}"/>
+                <a16:creationId xmlns:a16="http://schemas.microsoft.com/office/drawing/2014/main" id="{CDACFF55-44CF-044E-CF7D-8C93179CD381}"/>
               </a:ext>
             </a:extLst>
           </p:cNvPr>
@@ -11718,26 +11642,19 @@
           <p:nvPr/>
         </p:nvPicPr>
         <p:blipFill>
-          <a:blip r:embed="rId6"/>
+          <a:blip r:embed="rId10"/>
           <a:stretch>
             <a:fillRect/>
           </a:stretch>
         </p:blipFill>
         <p:spPr>
           <a:xfrm>
-            <a:off x="1030904" y="691592"/>
-            <a:ext cx="7062387" cy="3760316"/>
+            <a:off x="1429947" y="2355548"/>
+            <a:ext cx="6276361" cy="1954932"/>
           </a:xfrm>
           <a:prstGeom prst="rect">
             <a:avLst/>
           </a:prstGeom>
-          <a:ln w="12700">
-            <a:solidFill>
-              <a:srgbClr val="FFFFFF">
-                <a:alpha val="20000"/>
-              </a:srgbClr>
-            </a:solidFill>
-          </a:ln>
         </p:spPr>
       </p:pic>
     </p:spTree>
@@ -11765,6 +11682,9 @@
                     <p:cTn id="3" fill="hold">
                       <p:stCondLst>
                         <p:cond delay="indefinite"/>
+                        <p:cond evt="onBegin" delay="0">
+                          <p:tn val="2"/>
+                        </p:cond>
                       </p:stCondLst>
                       <p:childTnLst>
                         <p:par>
@@ -11774,7 +11694,7 @@
                             </p:stCondLst>
                             <p:childTnLst>
                               <p:par>
-                                <p:cTn id="5" presetID="10" presetClass="entr" presetSubtype="0" fill="hold" nodeType="clickEffect">
+                                <p:cTn id="5" presetID="1" presetClass="entr" presetSubtype="0" fill="hold" nodeType="withEffect">
                                   <p:stCondLst>
                                     <p:cond delay="0"/>
                                   </p:stCondLst>
@@ -11787,7 +11707,7 @@
                                           </p:stCondLst>
                                         </p:cTn>
                                         <p:tgtEl>
-                                          <p:spTgt spid="2"/>
+                                          <p:spTgt spid="27"/>
                                         </p:tgtEl>
                                         <p:attrNameLst>
                                           <p:attrName>style.visibility</p:attrName>
@@ -11797,14 +11717,6 @@
                                         <p:strVal val="visible"/>
                                       </p:to>
                                     </p:set>
-                                    <p:animEffect transition="in" filter="fade">
-                                      <p:cBhvr>
-                                        <p:cTn id="7" dur="500"/>
-                                        <p:tgtEl>
-                                          <p:spTgt spid="2"/>
-                                        </p:tgtEl>
-                                      </p:cBhvr>
-                                    </p:animEffect>
                                   </p:childTnLst>
                                 </p:cTn>
                               </p:par>
@@ -11815,31 +11727,69 @@
                     </p:cTn>
                   </p:par>
                   <p:par>
-                    <p:cTn id="8" fill="hold">
+                    <p:cTn id="7" fill="hold">
                       <p:stCondLst>
                         <p:cond delay="indefinite"/>
                       </p:stCondLst>
                       <p:childTnLst>
                         <p:par>
-                          <p:cTn id="9" fill="hold">
+                          <p:cTn id="8" fill="hold">
                             <p:stCondLst>
                               <p:cond delay="0"/>
                             </p:stCondLst>
                             <p:childTnLst>
                               <p:par>
-                                <p:cTn id="10" presetID="10" presetClass="exit" presetSubtype="0" fill="hold" nodeType="clickEffect">
+                                <p:cTn id="9" presetID="2" presetClass="exit" presetSubtype="4" fill="hold" nodeType="clickEffect">
                                   <p:stCondLst>
                                     <p:cond delay="0"/>
                                   </p:stCondLst>
                                   <p:childTnLst>
-                                    <p:animEffect transition="out" filter="fade">
-                                      <p:cBhvr>
+                                    <p:anim calcmode="lin" valueType="num">
+                                      <p:cBhvr additive="base">
+                                        <p:cTn id="10" dur="500"/>
+                                        <p:tgtEl>
+                                          <p:spTgt spid="27"/>
+                                        </p:tgtEl>
+                                        <p:attrNameLst>
+                                          <p:attrName>ppt_x</p:attrName>
+                                        </p:attrNameLst>
+                                      </p:cBhvr>
+                                      <p:tavLst>
+                                        <p:tav tm="0">
+                                          <p:val>
+                                            <p:strVal val="ppt_x"/>
+                                          </p:val>
+                                        </p:tav>
+                                        <p:tav tm="100000">
+                                          <p:val>
+                                            <p:strVal val="ppt_x"/>
+                                          </p:val>
+                                        </p:tav>
+                                      </p:tavLst>
+                                    </p:anim>
+                                    <p:anim calcmode="lin" valueType="num">
+                                      <p:cBhvr additive="base">
                                         <p:cTn id="11" dur="500"/>
                                         <p:tgtEl>
-                                          <p:spTgt spid="2"/>
+                                          <p:spTgt spid="27"/>
                                         </p:tgtEl>
+                                        <p:attrNameLst>
+                                          <p:attrName>ppt_y</p:attrName>
+                                        </p:attrNameLst>
                                       </p:cBhvr>
-                                    </p:animEffect>
+                                      <p:tavLst>
+                                        <p:tav tm="0">
+                                          <p:val>
+                                            <p:strVal val="ppt_y"/>
+                                          </p:val>
+                                        </p:tav>
+                                        <p:tav tm="100000">
+                                          <p:val>
+                                            <p:strVal val="1+ppt_h/2"/>
+                                          </p:val>
+                                        </p:tav>
+                                      </p:tavLst>
+                                    </p:anim>
                                     <p:set>
                                       <p:cBhvr>
                                         <p:cTn id="12" dur="1" fill="hold">
@@ -11848,7 +11798,7 @@
                                           </p:stCondLst>
                                         </p:cTn>
                                         <p:tgtEl>
-                                          <p:spTgt spid="2"/>
+                                          <p:spTgt spid="27"/>
                                         </p:tgtEl>
                                         <p:attrNameLst>
                                           <p:attrName>style.visibility</p:attrName>
@@ -11864,36 +11814,27 @@
                             </p:childTnLst>
                           </p:cTn>
                         </p:par>
-                      </p:childTnLst>
-                    </p:cTn>
-                  </p:par>
-                  <p:par>
-                    <p:cTn id="13" fill="hold">
-                      <p:stCondLst>
-                        <p:cond delay="indefinite"/>
-                      </p:stCondLst>
-                      <p:childTnLst>
                         <p:par>
-                          <p:cTn id="14" fill="hold">
+                          <p:cTn id="13" fill="hold">
                             <p:stCondLst>
-                              <p:cond delay="0"/>
+                              <p:cond delay="500"/>
                             </p:stCondLst>
                             <p:childTnLst>
                               <p:par>
-                                <p:cTn id="15" presetID="10" presetClass="entr" presetSubtype="0" fill="hold" nodeType="clickEffect">
+                                <p:cTn id="14" presetID="1" presetClass="entr" presetSubtype="0" fill="hold" nodeType="afterEffect">
                                   <p:stCondLst>
                                     <p:cond delay="0"/>
                                   </p:stCondLst>
                                   <p:childTnLst>
                                     <p:set>
                                       <p:cBhvr>
-                                        <p:cTn id="16" dur="1" fill="hold">
+                                        <p:cTn id="15" dur="1" fill="hold">
                                           <p:stCondLst>
                                             <p:cond delay="0"/>
                                           </p:stCondLst>
                                         </p:cTn>
                                         <p:tgtEl>
-                                          <p:spTgt spid="3"/>
+                                          <p:spTgt spid="8"/>
                                         </p:tgtEl>
                                         <p:attrNameLst>
                                           <p:attrName>style.visibility</p:attrName>
@@ -11901,67 +11842,6 @@
                                       </p:cBhvr>
                                       <p:to>
                                         <p:strVal val="visible"/>
-                                      </p:to>
-                                    </p:set>
-                                    <p:animEffect transition="in" filter="fade">
-                                      <p:cBhvr>
-                                        <p:cTn id="17" dur="500"/>
-                                        <p:tgtEl>
-                                          <p:spTgt spid="3"/>
-                                        </p:tgtEl>
-                                      </p:cBhvr>
-                                    </p:animEffect>
-                                  </p:childTnLst>
-                                </p:cTn>
-                              </p:par>
-                            </p:childTnLst>
-                          </p:cTn>
-                        </p:par>
-                      </p:childTnLst>
-                    </p:cTn>
-                  </p:par>
-                  <p:par>
-                    <p:cTn id="18" fill="hold">
-                      <p:stCondLst>
-                        <p:cond delay="indefinite"/>
-                      </p:stCondLst>
-                      <p:childTnLst>
-                        <p:par>
-                          <p:cTn id="19" fill="hold">
-                            <p:stCondLst>
-                              <p:cond delay="0"/>
-                            </p:stCondLst>
-                            <p:childTnLst>
-                              <p:par>
-                                <p:cTn id="20" presetID="10" presetClass="exit" presetSubtype="0" fill="hold" nodeType="clickEffect">
-                                  <p:stCondLst>
-                                    <p:cond delay="0"/>
-                                  </p:stCondLst>
-                                  <p:childTnLst>
-                                    <p:animEffect transition="out" filter="fade">
-                                      <p:cBhvr>
-                                        <p:cTn id="21" dur="500"/>
-                                        <p:tgtEl>
-                                          <p:spTgt spid="3"/>
-                                        </p:tgtEl>
-                                      </p:cBhvr>
-                                    </p:animEffect>
-                                    <p:set>
-                                      <p:cBhvr>
-                                        <p:cTn id="22" dur="1" fill="hold">
-                                          <p:stCondLst>
-                                            <p:cond delay="499"/>
-                                          </p:stCondLst>
-                                        </p:cTn>
-                                        <p:tgtEl>
-                                          <p:spTgt spid="3"/>
-                                        </p:tgtEl>
-                                        <p:attrNameLst>
-                                          <p:attrName>style.visibility</p:attrName>
-                                        </p:attrNameLst>
-                                      </p:cBhvr>
-                                      <p:to>
-                                        <p:strVal val="hidden"/>
                                       </p:to>
                                     </p:set>
                                   </p:childTnLst>
@@ -11974,32 +11854,32 @@
                     </p:cTn>
                   </p:par>
                   <p:par>
-                    <p:cTn id="23" fill="hold">
+                    <p:cTn id="16" fill="hold">
                       <p:stCondLst>
                         <p:cond delay="indefinite"/>
                       </p:stCondLst>
                       <p:childTnLst>
                         <p:par>
-                          <p:cTn id="24" fill="hold">
+                          <p:cTn id="17" fill="hold">
                             <p:stCondLst>
                               <p:cond delay="0"/>
                             </p:stCondLst>
                             <p:childTnLst>
                               <p:par>
-                                <p:cTn id="25" presetID="10" presetClass="entr" presetSubtype="0" fill="hold" nodeType="clickEffect">
+                                <p:cTn id="18" presetID="2" presetClass="entr" presetSubtype="8" fill="hold" nodeType="clickEffect">
                                   <p:stCondLst>
                                     <p:cond delay="0"/>
                                   </p:stCondLst>
                                   <p:childTnLst>
                                     <p:set>
                                       <p:cBhvr>
-                                        <p:cTn id="26" dur="1" fill="hold">
+                                        <p:cTn id="19" dur="1" fill="hold">
                                           <p:stCondLst>
                                             <p:cond delay="0"/>
                                           </p:stCondLst>
                                         </p:cTn>
                                         <p:tgtEl>
-                                          <p:spTgt spid="4"/>
+                                          <p:spTgt spid="12"/>
                                         </p:tgtEl>
                                         <p:attrNameLst>
                                           <p:attrName>style.visibility</p:attrName>
@@ -12009,14 +11889,143 @@
                                         <p:strVal val="visible"/>
                                       </p:to>
                                     </p:set>
-                                    <p:animEffect transition="in" filter="fade">
+                                    <p:anim calcmode="lin" valueType="num">
+                                      <p:cBhvr additive="base">
+                                        <p:cTn id="20" dur="500" fill="hold"/>
+                                        <p:tgtEl>
+                                          <p:spTgt spid="12"/>
+                                        </p:tgtEl>
+                                        <p:attrNameLst>
+                                          <p:attrName>ppt_x</p:attrName>
+                                        </p:attrNameLst>
+                                      </p:cBhvr>
+                                      <p:tavLst>
+                                        <p:tav tm="0">
+                                          <p:val>
+                                            <p:strVal val="0-#ppt_w/2"/>
+                                          </p:val>
+                                        </p:tav>
+                                        <p:tav tm="100000">
+                                          <p:val>
+                                            <p:strVal val="#ppt_x"/>
+                                          </p:val>
+                                        </p:tav>
+                                      </p:tavLst>
+                                    </p:anim>
+                                    <p:anim calcmode="lin" valueType="num">
+                                      <p:cBhvr additive="base">
+                                        <p:cTn id="21" dur="500" fill="hold"/>
+                                        <p:tgtEl>
+                                          <p:spTgt spid="12"/>
+                                        </p:tgtEl>
+                                        <p:attrNameLst>
+                                          <p:attrName>ppt_y</p:attrName>
+                                        </p:attrNameLst>
+                                      </p:cBhvr>
+                                      <p:tavLst>
+                                        <p:tav tm="0">
+                                          <p:val>
+                                            <p:strVal val="#ppt_y"/>
+                                          </p:val>
+                                        </p:tav>
+                                        <p:tav tm="100000">
+                                          <p:val>
+                                            <p:strVal val="#ppt_y"/>
+                                          </p:val>
+                                        </p:tav>
+                                      </p:tavLst>
+                                    </p:anim>
+                                  </p:childTnLst>
+                                </p:cTn>
+                              </p:par>
+                            </p:childTnLst>
+                          </p:cTn>
+                        </p:par>
+                      </p:childTnLst>
+                    </p:cTn>
+                  </p:par>
+                  <p:par>
+                    <p:cTn id="22" fill="hold">
+                      <p:stCondLst>
+                        <p:cond delay="indefinite"/>
+                      </p:stCondLst>
+                      <p:childTnLst>
+                        <p:par>
+                          <p:cTn id="23" fill="hold">
+                            <p:stCondLst>
+                              <p:cond delay="0"/>
+                            </p:stCondLst>
+                            <p:childTnLst>
+                              <p:par>
+                                <p:cTn id="24" presetID="2" presetClass="entr" presetSubtype="2" fill="hold" nodeType="clickEffect">
+                                  <p:stCondLst>
+                                    <p:cond delay="0"/>
+                                  </p:stCondLst>
+                                  <p:childTnLst>
+                                    <p:set>
                                       <p:cBhvr>
-                                        <p:cTn id="27" dur="500"/>
+                                        <p:cTn id="25" dur="1" fill="hold">
+                                          <p:stCondLst>
+                                            <p:cond delay="0"/>
+                                          </p:stCondLst>
+                                        </p:cTn>
                                         <p:tgtEl>
-                                          <p:spTgt spid="4"/>
+                                          <p:spTgt spid="15"/>
                                         </p:tgtEl>
+                                        <p:attrNameLst>
+                                          <p:attrName>style.visibility</p:attrName>
+                                        </p:attrNameLst>
                                       </p:cBhvr>
-                                    </p:animEffect>
+                                      <p:to>
+                                        <p:strVal val="visible"/>
+                                      </p:to>
+                                    </p:set>
+                                    <p:anim calcmode="lin" valueType="num">
+                                      <p:cBhvr additive="base">
+                                        <p:cTn id="26" dur="500" fill="hold"/>
+                                        <p:tgtEl>
+                                          <p:spTgt spid="15"/>
+                                        </p:tgtEl>
+                                        <p:attrNameLst>
+                                          <p:attrName>ppt_x</p:attrName>
+                                        </p:attrNameLst>
+                                      </p:cBhvr>
+                                      <p:tavLst>
+                                        <p:tav tm="0">
+                                          <p:val>
+                                            <p:strVal val="1+#ppt_w/2"/>
+                                          </p:val>
+                                        </p:tav>
+                                        <p:tav tm="100000">
+                                          <p:val>
+                                            <p:strVal val="#ppt_x"/>
+                                          </p:val>
+                                        </p:tav>
+                                      </p:tavLst>
+                                    </p:anim>
+                                    <p:anim calcmode="lin" valueType="num">
+                                      <p:cBhvr additive="base">
+                                        <p:cTn id="27" dur="500" fill="hold"/>
+                                        <p:tgtEl>
+                                          <p:spTgt spid="15"/>
+                                        </p:tgtEl>
+                                        <p:attrNameLst>
+                                          <p:attrName>ppt_y</p:attrName>
+                                        </p:attrNameLst>
+                                      </p:cBhvr>
+                                      <p:tavLst>
+                                        <p:tav tm="0">
+                                          <p:val>
+                                            <p:strVal val="#ppt_y"/>
+                                          </p:val>
+                                        </p:tav>
+                                        <p:tav tm="100000">
+                                          <p:val>
+                                            <p:strVal val="#ppt_y"/>
+                                          </p:val>
+                                        </p:tav>
+                                      </p:tavLst>
+                                    </p:anim>
                                   </p:childTnLst>
                                 </p:cTn>
                               </p:par>
@@ -12039,28 +12048,93 @@
                             </p:stCondLst>
                             <p:childTnLst>
                               <p:par>
-                                <p:cTn id="30" presetID="10" presetClass="exit" presetSubtype="0" fill="hold" nodeType="clickEffect">
+                                <p:cTn id="30" presetID="2" presetClass="entr" presetSubtype="4" fill="hold" nodeType="clickEffect">
                                   <p:stCondLst>
                                     <p:cond delay="0"/>
                                   </p:stCondLst>
                                   <p:childTnLst>
-                                    <p:animEffect transition="out" filter="fade">
-                                      <p:cBhvr>
-                                        <p:cTn id="31" dur="500"/>
-                                        <p:tgtEl>
-                                          <p:spTgt spid="4"/>
-                                        </p:tgtEl>
-                                      </p:cBhvr>
-                                    </p:animEffect>
                                     <p:set>
                                       <p:cBhvr>
-                                        <p:cTn id="32" dur="1" fill="hold">
+                                        <p:cTn id="31" dur="1" fill="hold">
                                           <p:stCondLst>
-                                            <p:cond delay="499"/>
+                                            <p:cond delay="0"/>
                                           </p:stCondLst>
                                         </p:cTn>
                                         <p:tgtEl>
-                                          <p:spTgt spid="4"/>
+                                          <p:spTgt spid="17"/>
+                                        </p:tgtEl>
+                                        <p:attrNameLst>
+                                          <p:attrName>style.visibility</p:attrName>
+                                        </p:attrNameLst>
+                                      </p:cBhvr>
+                                      <p:to>
+                                        <p:strVal val="visible"/>
+                                      </p:to>
+                                    </p:set>
+                                    <p:anim calcmode="lin" valueType="num">
+                                      <p:cBhvr additive="base">
+                                        <p:cTn id="32" dur="500" fill="hold"/>
+                                        <p:tgtEl>
+                                          <p:spTgt spid="17"/>
+                                        </p:tgtEl>
+                                        <p:attrNameLst>
+                                          <p:attrName>ppt_x</p:attrName>
+                                        </p:attrNameLst>
+                                      </p:cBhvr>
+                                      <p:tavLst>
+                                        <p:tav tm="0">
+                                          <p:val>
+                                            <p:strVal val="#ppt_x"/>
+                                          </p:val>
+                                        </p:tav>
+                                        <p:tav tm="100000">
+                                          <p:val>
+                                            <p:strVal val="#ppt_x"/>
+                                          </p:val>
+                                        </p:tav>
+                                      </p:tavLst>
+                                    </p:anim>
+                                    <p:anim calcmode="lin" valueType="num">
+                                      <p:cBhvr additive="base">
+                                        <p:cTn id="33" dur="500" fill="hold"/>
+                                        <p:tgtEl>
+                                          <p:spTgt spid="17"/>
+                                        </p:tgtEl>
+                                        <p:attrNameLst>
+                                          <p:attrName>ppt_y</p:attrName>
+                                        </p:attrNameLst>
+                                      </p:cBhvr>
+                                      <p:tavLst>
+                                        <p:tav tm="0">
+                                          <p:val>
+                                            <p:strVal val="1+#ppt_h/2"/>
+                                          </p:val>
+                                        </p:tav>
+                                        <p:tav tm="100000">
+                                          <p:val>
+                                            <p:strVal val="#ppt_y"/>
+                                          </p:val>
+                                        </p:tav>
+                                      </p:tavLst>
+                                    </p:anim>
+                                  </p:childTnLst>
+                                </p:cTn>
+                              </p:par>
+                              <p:par>
+                                <p:cTn id="34" presetID="1" presetClass="exit" presetSubtype="0" fill="hold" nodeType="withEffect">
+                                  <p:stCondLst>
+                                    <p:cond delay="0"/>
+                                  </p:stCondLst>
+                                  <p:childTnLst>
+                                    <p:set>
+                                      <p:cBhvr>
+                                        <p:cTn id="35" dur="1" fill="hold">
+                                          <p:stCondLst>
+                                            <p:cond delay="0"/>
+                                          </p:stCondLst>
+                                        </p:cTn>
+                                        <p:tgtEl>
+                                          <p:spTgt spid="15"/>
                                         </p:tgtEl>
                                         <p:attrNameLst>
                                           <p:attrName>style.visibility</p:attrName>
@@ -12073,56 +12147,30 @@
                                   </p:childTnLst>
                                 </p:cTn>
                               </p:par>
-                            </p:childTnLst>
-                          </p:cTn>
-                        </p:par>
-                      </p:childTnLst>
-                    </p:cTn>
-                  </p:par>
-                  <p:par>
-                    <p:cTn id="33" fill="hold">
-                      <p:stCondLst>
-                        <p:cond delay="indefinite"/>
-                      </p:stCondLst>
-                      <p:childTnLst>
-                        <p:par>
-                          <p:cTn id="34" fill="hold">
-                            <p:stCondLst>
-                              <p:cond delay="0"/>
-                            </p:stCondLst>
-                            <p:childTnLst>
                               <p:par>
-                                <p:cTn id="35" presetID="10" presetClass="entr" presetSubtype="0" fill="hold" nodeType="clickEffect">
+                                <p:cTn id="36" presetID="1" presetClass="exit" presetSubtype="0" fill="hold" nodeType="withEffect">
                                   <p:stCondLst>
                                     <p:cond delay="0"/>
                                   </p:stCondLst>
                                   <p:childTnLst>
                                     <p:set>
                                       <p:cBhvr>
-                                        <p:cTn id="36" dur="1" fill="hold">
+                                        <p:cTn id="37" dur="1" fill="hold">
                                           <p:stCondLst>
                                             <p:cond delay="0"/>
                                           </p:stCondLst>
                                         </p:cTn>
                                         <p:tgtEl>
-                                          <p:spTgt spid="6"/>
+                                          <p:spTgt spid="8"/>
                                         </p:tgtEl>
                                         <p:attrNameLst>
                                           <p:attrName>style.visibility</p:attrName>
                                         </p:attrNameLst>
                                       </p:cBhvr>
                                       <p:to>
-                                        <p:strVal val="visible"/>
+                                        <p:strVal val="hidden"/>
                                       </p:to>
                                     </p:set>
-                                    <p:animEffect transition="in" filter="fade">
-                                      <p:cBhvr>
-                                        <p:cTn id="37" dur="500"/>
-                                        <p:tgtEl>
-                                          <p:spTgt spid="6"/>
-                                        </p:tgtEl>
-                                      </p:cBhvr>
-                                    </p:animEffect>
                                   </p:childTnLst>
                                 </p:cTn>
                               </p:par>
@@ -12145,28 +12193,66 @@
                             </p:stCondLst>
                             <p:childTnLst>
                               <p:par>
-                                <p:cTn id="40" presetID="10" presetClass="exit" presetSubtype="0" fill="hold" nodeType="clickEffect">
+                                <p:cTn id="40" presetID="2" presetClass="exit" presetSubtype="8" fill="hold" nodeType="clickEffect">
                                   <p:stCondLst>
                                     <p:cond delay="0"/>
                                   </p:stCondLst>
                                   <p:childTnLst>
-                                    <p:animEffect transition="out" filter="fade">
-                                      <p:cBhvr>
+                                    <p:anim calcmode="lin" valueType="num">
+                                      <p:cBhvr additive="base">
                                         <p:cTn id="41" dur="500"/>
                                         <p:tgtEl>
-                                          <p:spTgt spid="6"/>
+                                          <p:spTgt spid="12"/>
                                         </p:tgtEl>
+                                        <p:attrNameLst>
+                                          <p:attrName>ppt_x</p:attrName>
+                                        </p:attrNameLst>
                                       </p:cBhvr>
-                                    </p:animEffect>
+                                      <p:tavLst>
+                                        <p:tav tm="0">
+                                          <p:val>
+                                            <p:strVal val="ppt_x"/>
+                                          </p:val>
+                                        </p:tav>
+                                        <p:tav tm="100000">
+                                          <p:val>
+                                            <p:strVal val="0-ppt_w/2"/>
+                                          </p:val>
+                                        </p:tav>
+                                      </p:tavLst>
+                                    </p:anim>
+                                    <p:anim calcmode="lin" valueType="num">
+                                      <p:cBhvr additive="base">
+                                        <p:cTn id="42" dur="500"/>
+                                        <p:tgtEl>
+                                          <p:spTgt spid="12"/>
+                                        </p:tgtEl>
+                                        <p:attrNameLst>
+                                          <p:attrName>ppt_y</p:attrName>
+                                        </p:attrNameLst>
+                                      </p:cBhvr>
+                                      <p:tavLst>
+                                        <p:tav tm="0">
+                                          <p:val>
+                                            <p:strVal val="ppt_y"/>
+                                          </p:val>
+                                        </p:tav>
+                                        <p:tav tm="100000">
+                                          <p:val>
+                                            <p:strVal val="ppt_y"/>
+                                          </p:val>
+                                        </p:tav>
+                                      </p:tavLst>
+                                    </p:anim>
                                     <p:set>
                                       <p:cBhvr>
-                                        <p:cTn id="42" dur="1" fill="hold">
+                                        <p:cTn id="43" dur="1" fill="hold">
                                           <p:stCondLst>
                                             <p:cond delay="499"/>
                                           </p:stCondLst>
                                         </p:cTn>
                                         <p:tgtEl>
-                                          <p:spTgt spid="6"/>
+                                          <p:spTgt spid="12"/>
                                         </p:tgtEl>
                                         <p:attrNameLst>
                                           <p:attrName>style.visibility</p:attrName>
@@ -12176,6 +12262,288 @@
                                         <p:strVal val="hidden"/>
                                       </p:to>
                                     </p:set>
+                                  </p:childTnLst>
+                                </p:cTn>
+                              </p:par>
+                            </p:childTnLst>
+                          </p:cTn>
+                        </p:par>
+                        <p:par>
+                          <p:cTn id="44" fill="hold">
+                            <p:stCondLst>
+                              <p:cond delay="500"/>
+                            </p:stCondLst>
+                            <p:childTnLst>
+                              <p:par>
+                                <p:cTn id="45" presetID="2" presetClass="exit" presetSubtype="4" fill="hold" nodeType="afterEffect">
+                                  <p:stCondLst>
+                                    <p:cond delay="0"/>
+                                  </p:stCondLst>
+                                  <p:childTnLst>
+                                    <p:anim calcmode="lin" valueType="num">
+                                      <p:cBhvr additive="base">
+                                        <p:cTn id="46" dur="500"/>
+                                        <p:tgtEl>
+                                          <p:spTgt spid="17"/>
+                                        </p:tgtEl>
+                                        <p:attrNameLst>
+                                          <p:attrName>ppt_x</p:attrName>
+                                        </p:attrNameLst>
+                                      </p:cBhvr>
+                                      <p:tavLst>
+                                        <p:tav tm="0">
+                                          <p:val>
+                                            <p:strVal val="ppt_x"/>
+                                          </p:val>
+                                        </p:tav>
+                                        <p:tav tm="100000">
+                                          <p:val>
+                                            <p:strVal val="ppt_x"/>
+                                          </p:val>
+                                        </p:tav>
+                                      </p:tavLst>
+                                    </p:anim>
+                                    <p:anim calcmode="lin" valueType="num">
+                                      <p:cBhvr additive="base">
+                                        <p:cTn id="47" dur="500"/>
+                                        <p:tgtEl>
+                                          <p:spTgt spid="17"/>
+                                        </p:tgtEl>
+                                        <p:attrNameLst>
+                                          <p:attrName>ppt_y</p:attrName>
+                                        </p:attrNameLst>
+                                      </p:cBhvr>
+                                      <p:tavLst>
+                                        <p:tav tm="0">
+                                          <p:val>
+                                            <p:strVal val="ppt_y"/>
+                                          </p:val>
+                                        </p:tav>
+                                        <p:tav tm="100000">
+                                          <p:val>
+                                            <p:strVal val="1+ppt_h/2"/>
+                                          </p:val>
+                                        </p:tav>
+                                      </p:tavLst>
+                                    </p:anim>
+                                    <p:set>
+                                      <p:cBhvr>
+                                        <p:cTn id="48" dur="1" fill="hold">
+                                          <p:stCondLst>
+                                            <p:cond delay="499"/>
+                                          </p:stCondLst>
+                                        </p:cTn>
+                                        <p:tgtEl>
+                                          <p:spTgt spid="17"/>
+                                        </p:tgtEl>
+                                        <p:attrNameLst>
+                                          <p:attrName>style.visibility</p:attrName>
+                                        </p:attrNameLst>
+                                      </p:cBhvr>
+                                      <p:to>
+                                        <p:strVal val="hidden"/>
+                                      </p:to>
+                                    </p:set>
+                                  </p:childTnLst>
+                                </p:cTn>
+                              </p:par>
+                            </p:childTnLst>
+                          </p:cTn>
+                        </p:par>
+                        <p:par>
+                          <p:cTn id="49" fill="hold">
+                            <p:stCondLst>
+                              <p:cond delay="1000"/>
+                            </p:stCondLst>
+                            <p:childTnLst>
+                              <p:par>
+                                <p:cTn id="50" presetID="1" presetClass="entr" presetSubtype="0" fill="hold" nodeType="afterEffect">
+                                  <p:stCondLst>
+                                    <p:cond delay="0"/>
+                                  </p:stCondLst>
+                                  <p:childTnLst>
+                                    <p:set>
+                                      <p:cBhvr>
+                                        <p:cTn id="51" dur="1" fill="hold">
+                                          <p:stCondLst>
+                                            <p:cond delay="0"/>
+                                          </p:stCondLst>
+                                        </p:cTn>
+                                        <p:tgtEl>
+                                          <p:spTgt spid="21"/>
+                                        </p:tgtEl>
+                                        <p:attrNameLst>
+                                          <p:attrName>style.visibility</p:attrName>
+                                        </p:attrNameLst>
+                                      </p:cBhvr>
+                                      <p:to>
+                                        <p:strVal val="visible"/>
+                                      </p:to>
+                                    </p:set>
+                                  </p:childTnLst>
+                                </p:cTn>
+                              </p:par>
+                            </p:childTnLst>
+                          </p:cTn>
+                        </p:par>
+                      </p:childTnLst>
+                    </p:cTn>
+                  </p:par>
+                  <p:par>
+                    <p:cTn id="52" fill="hold">
+                      <p:stCondLst>
+                        <p:cond delay="indefinite"/>
+                      </p:stCondLst>
+                      <p:childTnLst>
+                        <p:par>
+                          <p:cTn id="53" fill="hold">
+                            <p:stCondLst>
+                              <p:cond delay="0"/>
+                            </p:stCondLst>
+                            <p:childTnLst>
+                              <p:par>
+                                <p:cTn id="54" presetID="2" presetClass="entr" presetSubtype="8" fill="hold" nodeType="clickEffect">
+                                  <p:stCondLst>
+                                    <p:cond delay="0"/>
+                                  </p:stCondLst>
+                                  <p:childTnLst>
+                                    <p:set>
+                                      <p:cBhvr>
+                                        <p:cTn id="55" dur="1" fill="hold">
+                                          <p:stCondLst>
+                                            <p:cond delay="0"/>
+                                          </p:stCondLst>
+                                        </p:cTn>
+                                        <p:tgtEl>
+                                          <p:spTgt spid="23"/>
+                                        </p:tgtEl>
+                                        <p:attrNameLst>
+                                          <p:attrName>style.visibility</p:attrName>
+                                        </p:attrNameLst>
+                                      </p:cBhvr>
+                                      <p:to>
+                                        <p:strVal val="visible"/>
+                                      </p:to>
+                                    </p:set>
+                                    <p:anim calcmode="lin" valueType="num">
+                                      <p:cBhvr additive="base">
+                                        <p:cTn id="56" dur="500" fill="hold"/>
+                                        <p:tgtEl>
+                                          <p:spTgt spid="23"/>
+                                        </p:tgtEl>
+                                        <p:attrNameLst>
+                                          <p:attrName>ppt_x</p:attrName>
+                                        </p:attrNameLst>
+                                      </p:cBhvr>
+                                      <p:tavLst>
+                                        <p:tav tm="0">
+                                          <p:val>
+                                            <p:strVal val="0-#ppt_w/2"/>
+                                          </p:val>
+                                        </p:tav>
+                                        <p:tav tm="100000">
+                                          <p:val>
+                                            <p:strVal val="#ppt_x"/>
+                                          </p:val>
+                                        </p:tav>
+                                      </p:tavLst>
+                                    </p:anim>
+                                    <p:anim calcmode="lin" valueType="num">
+                                      <p:cBhvr additive="base">
+                                        <p:cTn id="57" dur="500" fill="hold"/>
+                                        <p:tgtEl>
+                                          <p:spTgt spid="23"/>
+                                        </p:tgtEl>
+                                        <p:attrNameLst>
+                                          <p:attrName>ppt_y</p:attrName>
+                                        </p:attrNameLst>
+                                      </p:cBhvr>
+                                      <p:tavLst>
+                                        <p:tav tm="0">
+                                          <p:val>
+                                            <p:strVal val="#ppt_y"/>
+                                          </p:val>
+                                        </p:tav>
+                                        <p:tav tm="100000">
+                                          <p:val>
+                                            <p:strVal val="#ppt_y"/>
+                                          </p:val>
+                                        </p:tav>
+                                      </p:tavLst>
+                                    </p:anim>
+                                  </p:childTnLst>
+                                </p:cTn>
+                              </p:par>
+                              <p:par>
+                                <p:cTn id="58" presetID="2" presetClass="entr" presetSubtype="2" fill="hold" nodeType="withEffect">
+                                  <p:stCondLst>
+                                    <p:cond delay="0"/>
+                                  </p:stCondLst>
+                                  <p:childTnLst>
+                                    <p:set>
+                                      <p:cBhvr>
+                                        <p:cTn id="59" dur="1" fill="hold">
+                                          <p:stCondLst>
+                                            <p:cond delay="0"/>
+                                          </p:stCondLst>
+                                        </p:cTn>
+                                        <p:tgtEl>
+                                          <p:spTgt spid="25"/>
+                                        </p:tgtEl>
+                                        <p:attrNameLst>
+                                          <p:attrName>style.visibility</p:attrName>
+                                        </p:attrNameLst>
+                                      </p:cBhvr>
+                                      <p:to>
+                                        <p:strVal val="visible"/>
+                                      </p:to>
+                                    </p:set>
+                                    <p:anim calcmode="lin" valueType="num">
+                                      <p:cBhvr additive="base">
+                                        <p:cTn id="60" dur="500" fill="hold"/>
+                                        <p:tgtEl>
+                                          <p:spTgt spid="25"/>
+                                        </p:tgtEl>
+                                        <p:attrNameLst>
+                                          <p:attrName>ppt_x</p:attrName>
+                                        </p:attrNameLst>
+                                      </p:cBhvr>
+                                      <p:tavLst>
+                                        <p:tav tm="0">
+                                          <p:val>
+                                            <p:strVal val="1+#ppt_w/2"/>
+                                          </p:val>
+                                        </p:tav>
+                                        <p:tav tm="100000">
+                                          <p:val>
+                                            <p:strVal val="#ppt_x"/>
+                                          </p:val>
+                                        </p:tav>
+                                      </p:tavLst>
+                                    </p:anim>
+                                    <p:anim calcmode="lin" valueType="num">
+                                      <p:cBhvr additive="base">
+                                        <p:cTn id="61" dur="500" fill="hold"/>
+                                        <p:tgtEl>
+                                          <p:spTgt spid="25"/>
+                                        </p:tgtEl>
+                                        <p:attrNameLst>
+                                          <p:attrName>ppt_y</p:attrName>
+                                        </p:attrNameLst>
+                                      </p:cBhvr>
+                                      <p:tavLst>
+                                        <p:tav tm="0">
+                                          <p:val>
+                                            <p:strVal val="#ppt_y"/>
+                                          </p:val>
+                                        </p:tav>
+                                        <p:tav tm="100000">
+                                          <p:val>
+                                            <p:strVal val="#ppt_y"/>
+                                          </p:val>
+                                        </p:tav>
+                                      </p:tavLst>
+                                    </p:anim>
                                   </p:childTnLst>
                                 </p:cTn>
                               </p:par>
@@ -12243,7 +12611,7 @@
         </p:nvSpPr>
         <p:spPr>
           <a:xfrm>
-            <a:off x="260600" y="3687796"/>
+            <a:off x="560924" y="3353415"/>
             <a:ext cx="1871700" cy="760898"/>
           </a:xfrm>
           <a:prstGeom prst="rect">
@@ -12301,7 +12669,7 @@
         </p:nvSpPr>
         <p:spPr>
           <a:xfrm>
-            <a:off x="2790156" y="3976745"/>
+            <a:off x="3139930" y="3638535"/>
             <a:ext cx="183000" cy="183000"/>
           </a:xfrm>
           <a:prstGeom prst="ellipse">
@@ -12348,7 +12716,7 @@
               </a:spcAft>
               <a:buNone/>
             </a:pPr>
-            <a:endParaRPr/>
+            <a:endParaRPr dirty="0"/>
           </a:p>
         </p:txBody>
       </p:sp>
@@ -12360,7 +12728,7 @@
         </p:nvSpPr>
         <p:spPr>
           <a:xfrm>
-            <a:off x="486504" y="2717771"/>
+            <a:off x="815432" y="1075254"/>
             <a:ext cx="1645796" cy="367800"/>
           </a:xfrm>
           <a:prstGeom prst="rect">
@@ -12418,7 +12786,7 @@
         </p:nvSpPr>
         <p:spPr>
           <a:xfrm>
-            <a:off x="2682210" y="2813188"/>
+            <a:off x="3136073" y="1167654"/>
             <a:ext cx="183000" cy="183000"/>
           </a:xfrm>
           <a:prstGeom prst="ellipse">
@@ -12481,8 +12849,8 @@
         </p:nvCxnSpPr>
         <p:spPr>
           <a:xfrm>
-            <a:off x="2132300" y="2901671"/>
-            <a:ext cx="549910" cy="3017"/>
+            <a:off x="2461228" y="1259154"/>
+            <a:ext cx="674845" cy="0"/>
           </a:xfrm>
           <a:prstGeom prst="straightConnector1">
             <a:avLst/>
@@ -12510,9 +12878,9 @@
           <p:nvPr/>
         </p:nvCxnSpPr>
         <p:spPr>
-          <a:xfrm>
-            <a:off x="2132300" y="4068245"/>
-            <a:ext cx="657856" cy="0"/>
+          <a:xfrm flipV="1">
+            <a:off x="2432624" y="3730035"/>
+            <a:ext cx="707306" cy="3829"/>
           </a:xfrm>
           <a:prstGeom prst="straightConnector1">
             <a:avLst/>
@@ -12531,10 +12899,10 @@
       </p:cxnSp>
       <p:pic>
         <p:nvPicPr>
-          <p:cNvPr id="5" name="Kép 4">
+          <p:cNvPr id="7" name="Kép 6">
             <a:extLst>
               <a:ext uri="{FF2B5EF4-FFF2-40B4-BE49-F238E27FC236}">
-                <a16:creationId xmlns:a16="http://schemas.microsoft.com/office/drawing/2014/main" id="{4CF7E8C6-DEA9-B29C-F2F2-6CCD5E5229C8}"/>
+                <a16:creationId xmlns:a16="http://schemas.microsoft.com/office/drawing/2014/main" id="{168AE8A9-C82C-6268-34FA-50BA5F6B1396}"/>
               </a:ext>
             </a:extLst>
           </p:cNvPr>
@@ -12551,27 +12919,20 @@
         </p:blipFill>
         <p:spPr>
           <a:xfrm>
-            <a:off x="3056886" y="2550078"/>
-            <a:ext cx="4244400" cy="729966"/>
+            <a:off x="4451472" y="306575"/>
+            <a:ext cx="3255654" cy="2272957"/>
           </a:xfrm>
           <a:prstGeom prst="rect">
             <a:avLst/>
           </a:prstGeom>
-          <a:ln w="12700">
-            <a:solidFill>
-              <a:srgbClr val="FFFFFF">
-                <a:alpha val="20000"/>
-              </a:srgbClr>
-            </a:solidFill>
-          </a:ln>
         </p:spPr>
       </p:pic>
       <p:pic>
         <p:nvPicPr>
-          <p:cNvPr id="13" name="Kép 12">
+          <p:cNvPr id="22" name="Kép 21">
             <a:extLst>
               <a:ext uri="{FF2B5EF4-FFF2-40B4-BE49-F238E27FC236}">
-                <a16:creationId xmlns:a16="http://schemas.microsoft.com/office/drawing/2014/main" id="{6EFA393E-C562-19B2-E24F-5B714AFF3E54}"/>
+                <a16:creationId xmlns:a16="http://schemas.microsoft.com/office/drawing/2014/main" id="{9BCAB917-3691-033E-6921-14710300A676}"/>
               </a:ext>
             </a:extLst>
           </p:cNvPr>
@@ -12580,34 +12941,28 @@
           </p:cNvPicPr>
           <p:nvPr/>
         </p:nvPicPr>
-        <p:blipFill rotWithShape="1">
+        <p:blipFill>
           <a:blip r:embed="rId4"/>
-          <a:srcRect r="29150"/>
-          <a:stretch/>
+          <a:stretch>
+            <a:fillRect/>
+          </a:stretch>
         </p:blipFill>
         <p:spPr>
           <a:xfrm>
-            <a:off x="141543" y="467830"/>
-            <a:ext cx="4867974" cy="1502272"/>
+            <a:off x="4451472" y="2733953"/>
+            <a:ext cx="2774117" cy="1816823"/>
           </a:xfrm>
           <a:prstGeom prst="rect">
             <a:avLst/>
           </a:prstGeom>
-          <a:ln w="12700">
-            <a:solidFill>
-              <a:srgbClr val="FFFFFF">
-                <a:alpha val="20000"/>
-              </a:srgbClr>
-            </a:solidFill>
-          </a:ln>
         </p:spPr>
       </p:pic>
       <p:pic>
         <p:nvPicPr>
-          <p:cNvPr id="16" name="Kép 15">
+          <p:cNvPr id="672" name="Kép 671">
             <a:extLst>
               <a:ext uri="{FF2B5EF4-FFF2-40B4-BE49-F238E27FC236}">
-                <a16:creationId xmlns:a16="http://schemas.microsoft.com/office/drawing/2014/main" id="{21EE74DD-1D17-9BCD-D15B-1F5605D4F415}"/>
+                <a16:creationId xmlns:a16="http://schemas.microsoft.com/office/drawing/2014/main" id="{A675E083-3CB9-8750-4EC4-E1B69DEE68C7}"/>
               </a:ext>
             </a:extLst>
           </p:cNvPr>
@@ -12624,27 +12979,20 @@
         </p:blipFill>
         <p:spPr>
           <a:xfrm>
-            <a:off x="5179086" y="467830"/>
-            <a:ext cx="3598037" cy="1502273"/>
+            <a:off x="5271697" y="1781704"/>
+            <a:ext cx="3554453" cy="2650592"/>
           </a:xfrm>
           <a:prstGeom prst="rect">
             <a:avLst/>
           </a:prstGeom>
-          <a:ln w="12700">
-            <a:solidFill>
-              <a:srgbClr val="FFFFFF">
-                <a:alpha val="20000"/>
-              </a:srgbClr>
-            </a:solidFill>
-          </a:ln>
         </p:spPr>
       </p:pic>
       <p:pic>
         <p:nvPicPr>
-          <p:cNvPr id="20" name="Kép 19">
+          <p:cNvPr id="30" name="Kép 29">
             <a:extLst>
               <a:ext uri="{FF2B5EF4-FFF2-40B4-BE49-F238E27FC236}">
-                <a16:creationId xmlns:a16="http://schemas.microsoft.com/office/drawing/2014/main" id="{A7F94108-5E1A-8F82-0F21-98832956D794}"/>
+                <a16:creationId xmlns:a16="http://schemas.microsoft.com/office/drawing/2014/main" id="{7F692AFE-1963-5A7A-09A1-DDDDE6C696AD}"/>
               </a:ext>
             </a:extLst>
           </p:cNvPr>
@@ -12661,63 +13009,58 @@
         </p:blipFill>
         <p:spPr>
           <a:xfrm>
-            <a:off x="3257288" y="3377869"/>
-            <a:ext cx="2621679" cy="1380751"/>
+            <a:off x="1436874" y="1439163"/>
+            <a:ext cx="2774117" cy="1826001"/>
           </a:xfrm>
           <a:prstGeom prst="rect">
             <a:avLst/>
           </a:prstGeom>
-          <a:ln w="12700">
-            <a:solidFill>
-              <a:srgbClr val="FFFFFF">
-                <a:alpha val="20000"/>
-              </a:srgbClr>
-            </a:solidFill>
-          </a:ln>
         </p:spPr>
       </p:pic>
-      <p:pic>
-        <p:nvPicPr>
-          <p:cNvPr id="2" name="Kép 1">
+      <p:sp>
+        <p:nvSpPr>
+          <p:cNvPr id="674" name="Szövegdoboz 673">
             <a:extLst>
               <a:ext uri="{FF2B5EF4-FFF2-40B4-BE49-F238E27FC236}">
-                <a16:creationId xmlns:a16="http://schemas.microsoft.com/office/drawing/2014/main" id="{84A43F1D-F0F6-1551-166C-610EDF488CEE}"/>
+                <a16:creationId xmlns:a16="http://schemas.microsoft.com/office/drawing/2014/main" id="{3DAAB54B-CC30-0761-5F2B-A2232768B345}"/>
               </a:ext>
             </a:extLst>
           </p:cNvPr>
-          <p:cNvPicPr>
-            <a:picLocks noChangeAspect="1"/>
-          </p:cNvPicPr>
+          <p:cNvSpPr txBox="1"/>
           <p:nvPr/>
-        </p:nvPicPr>
-        <p:blipFill rotWithShape="1">
-          <a:blip r:embed="rId4"/>
-          <a:srcRect r="29150"/>
-          <a:stretch/>
-        </p:blipFill>
-        <p:spPr>
-          <a:xfrm>
-            <a:off x="0" y="1154878"/>
-            <a:ext cx="9144000" cy="2821867"/>
+        </p:nvSpPr>
+        <p:spPr>
+          <a:xfrm>
+            <a:off x="3083967" y="461988"/>
+            <a:ext cx="2976066" cy="769441"/>
           </a:xfrm>
           <a:prstGeom prst="rect">
             <a:avLst/>
           </a:prstGeom>
-          <a:ln w="12700">
-            <a:solidFill>
-              <a:srgbClr val="FFFFFF">
-                <a:alpha val="20000"/>
-              </a:srgbClr>
-            </a:solidFill>
-          </a:ln>
-        </p:spPr>
-      </p:pic>
+          <a:noFill/>
+        </p:spPr>
+        <p:txBody>
+          <a:bodyPr wrap="square" rtlCol="0">
+            <a:spAutoFit/>
+          </a:bodyPr>
+          <a:lstStyle/>
+          <a:p>
+            <a:r>
+              <a:rPr lang="hu-HU" sz="4400" dirty="0">
+                <a:latin typeface="Poppins Black" panose="00000A00000000000000" pitchFamily="2" charset="-18"/>
+                <a:cs typeface="Poppins Black" panose="00000A00000000000000" pitchFamily="2" charset="-18"/>
+              </a:rPr>
+              <a:t>Funkciók</a:t>
+            </a:r>
+          </a:p>
+        </p:txBody>
+      </p:sp>
       <p:pic>
         <p:nvPicPr>
-          <p:cNvPr id="3" name="Kép 2">
+          <p:cNvPr id="680" name="Kép 679">
             <a:extLst>
               <a:ext uri="{FF2B5EF4-FFF2-40B4-BE49-F238E27FC236}">
-                <a16:creationId xmlns:a16="http://schemas.microsoft.com/office/drawing/2014/main" id="{ED6E9076-8223-DC9B-7ABC-9598DE712752}"/>
+                <a16:creationId xmlns:a16="http://schemas.microsoft.com/office/drawing/2014/main" id="{7676B648-CDF9-AD4F-AD7D-B9927A92C7B5}"/>
               </a:ext>
             </a:extLst>
           </p:cNvPr>
@@ -12727,65 +13070,54 @@
           <p:nvPr/>
         </p:nvPicPr>
         <p:blipFill>
-          <a:blip r:embed="rId5"/>
-          <a:stretch>
-            <a:fillRect/>
-          </a:stretch>
+          <a:blip r:embed="rId7"/>
+          <a:srcRect/>
+          <a:stretch/>
         </p:blipFill>
         <p:spPr>
           <a:xfrm>
-            <a:off x="1156522" y="1137216"/>
-            <a:ext cx="6745865" cy="2816572"/>
+            <a:off x="1830746" y="3392199"/>
+            <a:ext cx="3158100" cy="1221672"/>
           </a:xfrm>
           <a:prstGeom prst="rect">
             <a:avLst/>
           </a:prstGeom>
-          <a:ln w="12700">
-            <a:solidFill>
-              <a:srgbClr val="FFFFFF">
-                <a:alpha val="20000"/>
-              </a:srgbClr>
-            </a:solidFill>
-          </a:ln>
         </p:spPr>
       </p:pic>
-      <p:pic>
-        <p:nvPicPr>
-          <p:cNvPr id="4" name="Kép 3">
+      <p:cxnSp>
+        <p:nvCxnSpPr>
+          <p:cNvPr id="681" name="Google Shape;289;p37">
             <a:extLst>
               <a:ext uri="{FF2B5EF4-FFF2-40B4-BE49-F238E27FC236}">
-                <a16:creationId xmlns:a16="http://schemas.microsoft.com/office/drawing/2014/main" id="{5C6C9D48-D9E4-0D0C-7E94-0BCE0052FDA6}"/>
+                <a16:creationId xmlns:a16="http://schemas.microsoft.com/office/drawing/2014/main" id="{B1204B7E-7D5E-B3C3-3288-7971B2FE40DC}"/>
               </a:ext>
             </a:extLst>
           </p:cNvPr>
-          <p:cNvPicPr>
-            <a:picLocks noChangeAspect="1"/>
-          </p:cNvPicPr>
+          <p:cNvCxnSpPr>
+            <a:cxnSpLocks/>
+          </p:cNvCxnSpPr>
           <p:nvPr/>
-        </p:nvPicPr>
-        <p:blipFill>
-          <a:blip r:embed="rId3"/>
-          <a:stretch>
-            <a:fillRect/>
-          </a:stretch>
-        </p:blipFill>
-        <p:spPr>
-          <a:xfrm>
-            <a:off x="-5729" y="1757151"/>
-            <a:ext cx="9149729" cy="1573602"/>
-          </a:xfrm>
-          <a:prstGeom prst="rect">
-            <a:avLst/>
-          </a:prstGeom>
-          <a:ln w="12700">
+        </p:nvCxnSpPr>
+        <p:spPr>
+          <a:xfrm rot="10800000">
+            <a:off x="2600850" y="1194350"/>
+            <a:ext cx="3942300" cy="0"/>
+          </a:xfrm>
+          <a:prstGeom prst="straightConnector1">
+            <a:avLst/>
+          </a:prstGeom>
+          <a:noFill/>
+          <a:ln w="9525" cap="flat" cmpd="sng">
             <a:solidFill>
-              <a:srgbClr val="FFFFFF">
-                <a:alpha val="20000"/>
-              </a:srgbClr>
+              <a:schemeClr val="dk1"/>
             </a:solidFill>
+            <a:prstDash val="solid"/>
+            <a:round/>
+            <a:headEnd type="none" w="med" len="med"/>
+            <a:tailEnd type="none" w="med" len="med"/>
           </a:ln>
         </p:spPr>
-      </p:pic>
+      </p:cxnSp>
     </p:spTree>
     <p:extLst>
       <p:ext uri="{BB962C8B-B14F-4D97-AF65-F5344CB8AC3E}">
@@ -12820,7 +13152,7 @@
                             </p:stCondLst>
                             <p:childTnLst>
                               <p:par>
-                                <p:cTn id="5" presetID="10" presetClass="entr" presetSubtype="0" fill="hold" nodeType="clickEffect">
+                                <p:cTn id="5" presetID="1" presetClass="exit" presetSubtype="0" fill="hold" grpId="0" nodeType="clickEffect">
                                   <p:stCondLst>
                                     <p:cond delay="0"/>
                                   </p:stCondLst>
@@ -12833,68 +13165,196 @@
                                           </p:stCondLst>
                                         </p:cTn>
                                         <p:tgtEl>
-                                          <p:spTgt spid="2"/>
+                                          <p:spTgt spid="676"/>
                                         </p:tgtEl>
                                         <p:attrNameLst>
                                           <p:attrName>style.visibility</p:attrName>
                                         </p:attrNameLst>
                                       </p:cBhvr>
                                       <p:to>
-                                        <p:strVal val="visible"/>
+                                        <p:strVal val="hidden"/>
                                       </p:to>
                                     </p:set>
-                                    <p:animEffect transition="in" filter="fade">
-                                      <p:cBhvr>
-                                        <p:cTn id="7" dur="500"/>
-                                        <p:tgtEl>
-                                          <p:spTgt spid="2"/>
-                                        </p:tgtEl>
-                                      </p:cBhvr>
-                                    </p:animEffect>
                                   </p:childTnLst>
                                 </p:cTn>
                               </p:par>
-                            </p:childTnLst>
-                          </p:cTn>
-                        </p:par>
-                      </p:childTnLst>
-                    </p:cTn>
-                  </p:par>
-                  <p:par>
-                    <p:cTn id="8" fill="hold">
-                      <p:stCondLst>
-                        <p:cond delay="indefinite"/>
-                      </p:stCondLst>
-                      <p:childTnLst>
-                        <p:par>
-                          <p:cTn id="9" fill="hold">
-                            <p:stCondLst>
-                              <p:cond delay="0"/>
-                            </p:stCondLst>
-                            <p:childTnLst>
                               <p:par>
-                                <p:cTn id="10" presetID="10" presetClass="exit" presetSubtype="0" fill="hold" nodeType="clickEffect">
+                                <p:cTn id="7" presetID="1" presetClass="exit" presetSubtype="0" fill="hold" nodeType="withEffect">
                                   <p:stCondLst>
                                     <p:cond delay="0"/>
                                   </p:stCondLst>
                                   <p:childTnLst>
-                                    <p:animEffect transition="out" filter="fade">
+                                    <p:set>
                                       <p:cBhvr>
-                                        <p:cTn id="11" dur="500"/>
+                                        <p:cTn id="8" dur="1" fill="hold">
+                                          <p:stCondLst>
+                                            <p:cond delay="0"/>
+                                          </p:stCondLst>
+                                        </p:cTn>
                                         <p:tgtEl>
-                                          <p:spTgt spid="2"/>
+                                          <p:spTgt spid="773"/>
                                         </p:tgtEl>
+                                        <p:attrNameLst>
+                                          <p:attrName>style.visibility</p:attrName>
+                                        </p:attrNameLst>
                                       </p:cBhvr>
-                                    </p:animEffect>
+                                      <p:to>
+                                        <p:strVal val="hidden"/>
+                                      </p:to>
+                                    </p:set>
+                                  </p:childTnLst>
+                                </p:cTn>
+                              </p:par>
+                              <p:par>
+                                <p:cTn id="9" presetID="1" presetClass="exit" presetSubtype="0" fill="hold" grpId="0" nodeType="withEffect">
+                                  <p:stCondLst>
+                                    <p:cond delay="0"/>
+                                  </p:stCondLst>
+                                  <p:childTnLst>
+                                    <p:set>
+                                      <p:cBhvr>
+                                        <p:cTn id="10" dur="1" fill="hold">
+                                          <p:stCondLst>
+                                            <p:cond delay="0"/>
+                                          </p:stCondLst>
+                                        </p:cTn>
+                                        <p:tgtEl>
+                                          <p:spTgt spid="678"/>
+                                        </p:tgtEl>
+                                        <p:attrNameLst>
+                                          <p:attrName>style.visibility</p:attrName>
+                                        </p:attrNameLst>
+                                      </p:cBhvr>
+                                      <p:to>
+                                        <p:strVal val="hidden"/>
+                                      </p:to>
+                                    </p:set>
+                                  </p:childTnLst>
+                                </p:cTn>
+                              </p:par>
+                              <p:par>
+                                <p:cTn id="11" presetID="1" presetClass="exit" presetSubtype="0" fill="hold" nodeType="withEffect">
+                                  <p:stCondLst>
+                                    <p:cond delay="0"/>
+                                  </p:stCondLst>
+                                  <p:childTnLst>
                                     <p:set>
                                       <p:cBhvr>
                                         <p:cTn id="12" dur="1" fill="hold">
                                           <p:stCondLst>
-                                            <p:cond delay="499"/>
+                                            <p:cond delay="0"/>
                                           </p:stCondLst>
                                         </p:cTn>
                                         <p:tgtEl>
-                                          <p:spTgt spid="2"/>
+                                          <p:spTgt spid="7"/>
+                                        </p:tgtEl>
+                                        <p:attrNameLst>
+                                          <p:attrName>style.visibility</p:attrName>
+                                        </p:attrNameLst>
+                                      </p:cBhvr>
+                                      <p:to>
+                                        <p:strVal val="hidden"/>
+                                      </p:to>
+                                    </p:set>
+                                  </p:childTnLst>
+                                </p:cTn>
+                              </p:par>
+                              <p:par>
+                                <p:cTn id="13" presetID="1" presetClass="exit" presetSubtype="0" fill="hold" grpId="0" nodeType="withEffect">
+                                  <p:stCondLst>
+                                    <p:cond delay="0"/>
+                                  </p:stCondLst>
+                                  <p:childTnLst>
+                                    <p:set>
+                                      <p:cBhvr>
+                                        <p:cTn id="14" dur="1" fill="hold">
+                                          <p:stCondLst>
+                                            <p:cond delay="0"/>
+                                          </p:stCondLst>
+                                        </p:cTn>
+                                        <p:tgtEl>
+                                          <p:spTgt spid="668"/>
+                                        </p:tgtEl>
+                                        <p:attrNameLst>
+                                          <p:attrName>style.visibility</p:attrName>
+                                        </p:attrNameLst>
+                                      </p:cBhvr>
+                                      <p:to>
+                                        <p:strVal val="hidden"/>
+                                      </p:to>
+                                    </p:set>
+                                  </p:childTnLst>
+                                </p:cTn>
+                              </p:par>
+                              <p:par>
+                                <p:cTn id="15" presetID="1" presetClass="exit" presetSubtype="0" fill="hold" nodeType="withEffect">
+                                  <p:stCondLst>
+                                    <p:cond delay="0"/>
+                                  </p:stCondLst>
+                                  <p:childTnLst>
+                                    <p:set>
+                                      <p:cBhvr>
+                                        <p:cTn id="16" dur="1" fill="hold">
+                                          <p:stCondLst>
+                                            <p:cond delay="0"/>
+                                          </p:stCondLst>
+                                        </p:cTn>
+                                        <p:tgtEl>
+                                          <p:spTgt spid="774"/>
+                                        </p:tgtEl>
+                                        <p:attrNameLst>
+                                          <p:attrName>style.visibility</p:attrName>
+                                        </p:attrNameLst>
+                                      </p:cBhvr>
+                                      <p:to>
+                                        <p:strVal val="hidden"/>
+                                      </p:to>
+                                    </p:set>
+                                  </p:childTnLst>
+                                </p:cTn>
+                              </p:par>
+                              <p:par>
+                                <p:cTn id="17" presetID="1" presetClass="exit" presetSubtype="0" fill="hold" grpId="0" nodeType="withEffect">
+                                  <p:stCondLst>
+                                    <p:cond delay="0"/>
+                                  </p:stCondLst>
+                                  <p:childTnLst>
+                                    <p:set>
+                                      <p:cBhvr>
+                                        <p:cTn id="18" dur="1" fill="hold">
+                                          <p:stCondLst>
+                                            <p:cond delay="0"/>
+                                          </p:stCondLst>
+                                        </p:cTn>
+                                        <p:tgtEl>
+                                          <p:spTgt spid="673"/>
+                                        </p:tgtEl>
+                                        <p:attrNameLst>
+                                          <p:attrName>style.visibility</p:attrName>
+                                        </p:attrNameLst>
+                                      </p:cBhvr>
+                                      <p:to>
+                                        <p:strVal val="hidden"/>
+                                      </p:to>
+                                    </p:set>
+                                  </p:childTnLst>
+                                </p:cTn>
+                              </p:par>
+                              <p:par>
+                                <p:cTn id="19" presetID="1" presetClass="exit" presetSubtype="0" fill="hold" nodeType="withEffect">
+                                  <p:stCondLst>
+                                    <p:cond delay="0"/>
+                                  </p:stCondLst>
+                                  <p:childTnLst>
+                                    <p:set>
+                                      <p:cBhvr>
+                                        <p:cTn id="20" dur="1" fill="hold">
+                                          <p:stCondLst>
+                                            <p:cond delay="0"/>
+                                          </p:stCondLst>
+                                        </p:cTn>
+                                        <p:tgtEl>
+                                          <p:spTgt spid="22"/>
                                         </p:tgtEl>
                                         <p:attrNameLst>
                                           <p:attrName>style.visibility</p:attrName>
@@ -12910,36 +13370,27 @@
                             </p:childTnLst>
                           </p:cTn>
                         </p:par>
-                      </p:childTnLst>
-                    </p:cTn>
-                  </p:par>
-                  <p:par>
-                    <p:cTn id="13" fill="hold">
-                      <p:stCondLst>
-                        <p:cond delay="indefinite"/>
-                      </p:stCondLst>
-                      <p:childTnLst>
                         <p:par>
-                          <p:cTn id="14" fill="hold">
+                          <p:cTn id="21" fill="hold">
                             <p:stCondLst>
                               <p:cond delay="0"/>
                             </p:stCondLst>
                             <p:childTnLst>
                               <p:par>
-                                <p:cTn id="15" presetID="10" presetClass="entr" presetSubtype="0" fill="hold" nodeType="clickEffect">
+                                <p:cTn id="22" presetID="2" presetClass="entr" presetSubtype="8" fill="hold" grpId="0" nodeType="afterEffect">
                                   <p:stCondLst>
                                     <p:cond delay="0"/>
                                   </p:stCondLst>
                                   <p:childTnLst>
                                     <p:set>
                                       <p:cBhvr>
-                                        <p:cTn id="16" dur="1" fill="hold">
+                                        <p:cTn id="23" dur="1" fill="hold">
                                           <p:stCondLst>
                                             <p:cond delay="0"/>
                                           </p:stCondLst>
                                         </p:cTn>
                                         <p:tgtEl>
-                                          <p:spTgt spid="3"/>
+                                          <p:spTgt spid="674"/>
                                         </p:tgtEl>
                                         <p:attrNameLst>
                                           <p:attrName>style.visibility</p:attrName>
@@ -12949,103 +13400,70 @@
                                         <p:strVal val="visible"/>
                                       </p:to>
                                     </p:set>
-                                    <p:animEffect transition="in" filter="fade">
-                                      <p:cBhvr>
-                                        <p:cTn id="17" dur="500"/>
+                                    <p:anim calcmode="lin" valueType="num">
+                                      <p:cBhvr additive="base">
+                                        <p:cTn id="24" dur="500" fill="hold"/>
                                         <p:tgtEl>
-                                          <p:spTgt spid="3"/>
+                                          <p:spTgt spid="674"/>
                                         </p:tgtEl>
+                                        <p:attrNameLst>
+                                          <p:attrName>ppt_x</p:attrName>
+                                        </p:attrNameLst>
                                       </p:cBhvr>
-                                    </p:animEffect>
+                                      <p:tavLst>
+                                        <p:tav tm="0">
+                                          <p:val>
+                                            <p:strVal val="0-#ppt_w/2"/>
+                                          </p:val>
+                                        </p:tav>
+                                        <p:tav tm="100000">
+                                          <p:val>
+                                            <p:strVal val="#ppt_x"/>
+                                          </p:val>
+                                        </p:tav>
+                                      </p:tavLst>
+                                    </p:anim>
+                                    <p:anim calcmode="lin" valueType="num">
+                                      <p:cBhvr additive="base">
+                                        <p:cTn id="25" dur="500" fill="hold"/>
+                                        <p:tgtEl>
+                                          <p:spTgt spid="674"/>
+                                        </p:tgtEl>
+                                        <p:attrNameLst>
+                                          <p:attrName>ppt_y</p:attrName>
+                                        </p:attrNameLst>
+                                      </p:cBhvr>
+                                      <p:tavLst>
+                                        <p:tav tm="0">
+                                          <p:val>
+                                            <p:strVal val="#ppt_y"/>
+                                          </p:val>
+                                        </p:tav>
+                                        <p:tav tm="100000">
+                                          <p:val>
+                                            <p:strVal val="#ppt_y"/>
+                                          </p:val>
+                                        </p:tav>
+                                      </p:tavLst>
+                                    </p:anim>
                                   </p:childTnLst>
                                 </p:cTn>
                               </p:par>
-                            </p:childTnLst>
-                          </p:cTn>
-                        </p:par>
-                      </p:childTnLst>
-                    </p:cTn>
-                  </p:par>
-                  <p:par>
-                    <p:cTn id="18" fill="hold">
-                      <p:stCondLst>
-                        <p:cond delay="indefinite"/>
-                      </p:stCondLst>
-                      <p:childTnLst>
-                        <p:par>
-                          <p:cTn id="19" fill="hold">
-                            <p:stCondLst>
-                              <p:cond delay="0"/>
-                            </p:stCondLst>
-                            <p:childTnLst>
                               <p:par>
-                                <p:cTn id="20" presetID="10" presetClass="exit" presetSubtype="0" fill="hold" nodeType="clickEffect">
-                                  <p:stCondLst>
-                                    <p:cond delay="0"/>
-                                  </p:stCondLst>
-                                  <p:childTnLst>
-                                    <p:animEffect transition="out" filter="fade">
-                                      <p:cBhvr>
-                                        <p:cTn id="21" dur="500"/>
-                                        <p:tgtEl>
-                                          <p:spTgt spid="3"/>
-                                        </p:tgtEl>
-                                      </p:cBhvr>
-                                    </p:animEffect>
-                                    <p:set>
-                                      <p:cBhvr>
-                                        <p:cTn id="22" dur="1" fill="hold">
-                                          <p:stCondLst>
-                                            <p:cond delay="499"/>
-                                          </p:stCondLst>
-                                        </p:cTn>
-                                        <p:tgtEl>
-                                          <p:spTgt spid="3"/>
-                                        </p:tgtEl>
-                                        <p:attrNameLst>
-                                          <p:attrName>style.visibility</p:attrName>
-                                        </p:attrNameLst>
-                                      </p:cBhvr>
-                                      <p:to>
-                                        <p:strVal val="hidden"/>
-                                      </p:to>
-                                    </p:set>
-                                  </p:childTnLst>
-                                </p:cTn>
-                              </p:par>
-                            </p:childTnLst>
-                          </p:cTn>
-                        </p:par>
-                      </p:childTnLst>
-                    </p:cTn>
-                  </p:par>
-                  <p:par>
-                    <p:cTn id="23" fill="hold">
-                      <p:stCondLst>
-                        <p:cond delay="indefinite"/>
-                      </p:stCondLst>
-                      <p:childTnLst>
-                        <p:par>
-                          <p:cTn id="24" fill="hold">
-                            <p:stCondLst>
-                              <p:cond delay="0"/>
-                            </p:stCondLst>
-                            <p:childTnLst>
-                              <p:par>
-                                <p:cTn id="25" presetID="10" presetClass="entr" presetSubtype="0" fill="hold" nodeType="clickEffect">
+                                <p:cTn id="26" presetID="1" presetClass="entr" presetSubtype="0" fill="hold" nodeType="withEffect">
                                   <p:stCondLst>
                                     <p:cond delay="0"/>
                                   </p:stCondLst>
                                   <p:childTnLst>
                                     <p:set>
                                       <p:cBhvr>
-                                        <p:cTn id="26" dur="1" fill="hold">
+                                        <p:cTn id="27" dur="1" fill="hold">
                                           <p:stCondLst>
                                             <p:cond delay="0"/>
                                           </p:stCondLst>
                                         </p:cTn>
                                         <p:tgtEl>
-                                          <p:spTgt spid="4"/>
+                                          <p:spTgt spid="681"/>
                                         </p:tgtEl>
                                         <p:attrNameLst>
                                           <p:attrName>style.visibility</p:attrName>
@@ -13055,14 +13473,6 @@
                                         <p:strVal val="visible"/>
                                       </p:to>
                                     </p:set>
-                                    <p:animEffect transition="in" filter="fade">
-                                      <p:cBhvr>
-                                        <p:cTn id="27" dur="500"/>
-                                        <p:tgtEl>
-                                          <p:spTgt spid="4"/>
-                                        </p:tgtEl>
-                                      </p:cBhvr>
-                                    </p:animEffect>
                                   </p:childTnLst>
                                 </p:cTn>
                               </p:par>
@@ -13085,37 +13495,221 @@
                             </p:stCondLst>
                             <p:childTnLst>
                               <p:par>
-                                <p:cTn id="30" presetID="10" presetClass="exit" presetSubtype="0" fill="hold" nodeType="clickEffect">
+                                <p:cTn id="30" presetID="2" presetClass="entr" presetSubtype="12" fill="hold" nodeType="clickEffect">
                                   <p:stCondLst>
                                     <p:cond delay="0"/>
                                   </p:stCondLst>
                                   <p:childTnLst>
-                                    <p:animEffect transition="out" filter="fade">
-                                      <p:cBhvr>
-                                        <p:cTn id="31" dur="500"/>
-                                        <p:tgtEl>
-                                          <p:spTgt spid="4"/>
-                                        </p:tgtEl>
-                                      </p:cBhvr>
-                                    </p:animEffect>
                                     <p:set>
                                       <p:cBhvr>
-                                        <p:cTn id="32" dur="1" fill="hold">
+                                        <p:cTn id="31" dur="1" fill="hold">
                                           <p:stCondLst>
-                                            <p:cond delay="499"/>
+                                            <p:cond delay="0"/>
                                           </p:stCondLst>
                                         </p:cTn>
                                         <p:tgtEl>
-                                          <p:spTgt spid="4"/>
+                                          <p:spTgt spid="30"/>
                                         </p:tgtEl>
                                         <p:attrNameLst>
                                           <p:attrName>style.visibility</p:attrName>
                                         </p:attrNameLst>
                                       </p:cBhvr>
                                       <p:to>
-                                        <p:strVal val="hidden"/>
+                                        <p:strVal val="visible"/>
                                       </p:to>
                                     </p:set>
+                                    <p:anim calcmode="lin" valueType="num">
+                                      <p:cBhvr additive="base">
+                                        <p:cTn id="32" dur="500" fill="hold"/>
+                                        <p:tgtEl>
+                                          <p:spTgt spid="30"/>
+                                        </p:tgtEl>
+                                        <p:attrNameLst>
+                                          <p:attrName>ppt_x</p:attrName>
+                                        </p:attrNameLst>
+                                      </p:cBhvr>
+                                      <p:tavLst>
+                                        <p:tav tm="0">
+                                          <p:val>
+                                            <p:strVal val="0-#ppt_w/2"/>
+                                          </p:val>
+                                        </p:tav>
+                                        <p:tav tm="100000">
+                                          <p:val>
+                                            <p:strVal val="#ppt_x"/>
+                                          </p:val>
+                                        </p:tav>
+                                      </p:tavLst>
+                                    </p:anim>
+                                    <p:anim calcmode="lin" valueType="num">
+                                      <p:cBhvr additive="base">
+                                        <p:cTn id="33" dur="500" fill="hold"/>
+                                        <p:tgtEl>
+                                          <p:spTgt spid="30"/>
+                                        </p:tgtEl>
+                                        <p:attrNameLst>
+                                          <p:attrName>ppt_y</p:attrName>
+                                        </p:attrNameLst>
+                                      </p:cBhvr>
+                                      <p:tavLst>
+                                        <p:tav tm="0">
+                                          <p:val>
+                                            <p:strVal val="1+#ppt_h/2"/>
+                                          </p:val>
+                                        </p:tav>
+                                        <p:tav tm="100000">
+                                          <p:val>
+                                            <p:strVal val="#ppt_y"/>
+                                          </p:val>
+                                        </p:tav>
+                                      </p:tavLst>
+                                    </p:anim>
+                                  </p:childTnLst>
+                                </p:cTn>
+                              </p:par>
+                              <p:par>
+                                <p:cTn id="34" presetID="2" presetClass="entr" presetSubtype="6" fill="hold" nodeType="withEffect">
+                                  <p:stCondLst>
+                                    <p:cond delay="0"/>
+                                  </p:stCondLst>
+                                  <p:childTnLst>
+                                    <p:set>
+                                      <p:cBhvr>
+                                        <p:cTn id="35" dur="1" fill="hold">
+                                          <p:stCondLst>
+                                            <p:cond delay="0"/>
+                                          </p:stCondLst>
+                                        </p:cTn>
+                                        <p:tgtEl>
+                                          <p:spTgt spid="672"/>
+                                        </p:tgtEl>
+                                        <p:attrNameLst>
+                                          <p:attrName>style.visibility</p:attrName>
+                                        </p:attrNameLst>
+                                      </p:cBhvr>
+                                      <p:to>
+                                        <p:strVal val="visible"/>
+                                      </p:to>
+                                    </p:set>
+                                    <p:anim calcmode="lin" valueType="num">
+                                      <p:cBhvr additive="base">
+                                        <p:cTn id="36" dur="500" fill="hold"/>
+                                        <p:tgtEl>
+                                          <p:spTgt spid="672"/>
+                                        </p:tgtEl>
+                                        <p:attrNameLst>
+                                          <p:attrName>ppt_x</p:attrName>
+                                        </p:attrNameLst>
+                                      </p:cBhvr>
+                                      <p:tavLst>
+                                        <p:tav tm="0">
+                                          <p:val>
+                                            <p:strVal val="1+#ppt_w/2"/>
+                                          </p:val>
+                                        </p:tav>
+                                        <p:tav tm="100000">
+                                          <p:val>
+                                            <p:strVal val="#ppt_x"/>
+                                          </p:val>
+                                        </p:tav>
+                                      </p:tavLst>
+                                    </p:anim>
+                                    <p:anim calcmode="lin" valueType="num">
+                                      <p:cBhvr additive="base">
+                                        <p:cTn id="37" dur="500" fill="hold"/>
+                                        <p:tgtEl>
+                                          <p:spTgt spid="672"/>
+                                        </p:tgtEl>
+                                        <p:attrNameLst>
+                                          <p:attrName>ppt_y</p:attrName>
+                                        </p:attrNameLst>
+                                      </p:cBhvr>
+                                      <p:tavLst>
+                                        <p:tav tm="0">
+                                          <p:val>
+                                            <p:strVal val="1+#ppt_h/2"/>
+                                          </p:val>
+                                        </p:tav>
+                                        <p:tav tm="100000">
+                                          <p:val>
+                                            <p:strVal val="#ppt_y"/>
+                                          </p:val>
+                                        </p:tav>
+                                      </p:tavLst>
+                                    </p:anim>
+                                  </p:childTnLst>
+                                </p:cTn>
+                              </p:par>
+                              <p:par>
+                                <p:cTn id="38" presetID="2" presetClass="entr" presetSubtype="4" fill="hold" nodeType="withEffect">
+                                  <p:stCondLst>
+                                    <p:cond delay="0"/>
+                                  </p:stCondLst>
+                                  <p:childTnLst>
+                                    <p:set>
+                                      <p:cBhvr>
+                                        <p:cTn id="39" dur="1" fill="hold">
+                                          <p:stCondLst>
+                                            <p:cond delay="0"/>
+                                          </p:stCondLst>
+                                        </p:cTn>
+                                        <p:tgtEl>
+                                          <p:spTgt spid="680"/>
+                                        </p:tgtEl>
+                                        <p:attrNameLst>
+                                          <p:attrName>style.visibility</p:attrName>
+                                        </p:attrNameLst>
+                                      </p:cBhvr>
+                                      <p:to>
+                                        <p:strVal val="visible"/>
+                                      </p:to>
+                                    </p:set>
+                                    <p:anim calcmode="lin" valueType="num">
+                                      <p:cBhvr additive="base">
+                                        <p:cTn id="40" dur="500" fill="hold"/>
+                                        <p:tgtEl>
+                                          <p:spTgt spid="680"/>
+                                        </p:tgtEl>
+                                        <p:attrNameLst>
+                                          <p:attrName>ppt_x</p:attrName>
+                                        </p:attrNameLst>
+                                      </p:cBhvr>
+                                      <p:tavLst>
+                                        <p:tav tm="0">
+                                          <p:val>
+                                            <p:strVal val="#ppt_x"/>
+                                          </p:val>
+                                        </p:tav>
+                                        <p:tav tm="100000">
+                                          <p:val>
+                                            <p:strVal val="#ppt_x"/>
+                                          </p:val>
+                                        </p:tav>
+                                      </p:tavLst>
+                                    </p:anim>
+                                    <p:anim calcmode="lin" valueType="num">
+                                      <p:cBhvr additive="base">
+                                        <p:cTn id="41" dur="500" fill="hold"/>
+                                        <p:tgtEl>
+                                          <p:spTgt spid="680"/>
+                                        </p:tgtEl>
+                                        <p:attrNameLst>
+                                          <p:attrName>ppt_y</p:attrName>
+                                        </p:attrNameLst>
+                                      </p:cBhvr>
+                                      <p:tavLst>
+                                        <p:tav tm="0">
+                                          <p:val>
+                                            <p:strVal val="1+#ppt_h/2"/>
+                                          </p:val>
+                                        </p:tav>
+                                        <p:tav tm="100000">
+                                          <p:val>
+                                            <p:strVal val="#ppt_y"/>
+                                          </p:val>
+                                        </p:tav>
+                                      </p:tavLst>
+                                    </p:anim>
                                   </p:childTnLst>
                                 </p:cTn>
                               </p:par>
@@ -13146,6 +13740,13 @@
         </p:cTn>
       </p:par>
     </p:tnLst>
+    <p:bldLst>
+      <p:bldP spid="668" grpId="0"/>
+      <p:bldP spid="673" grpId="0" animBg="1"/>
+      <p:bldP spid="676" grpId="0"/>
+      <p:bldP spid="678" grpId="0" animBg="1"/>
+      <p:bldP spid="674" grpId="0"/>
+    </p:bldLst>
   </p:timing>
 </p:sld>
 </file>
@@ -13175,6 +13776,38 @@
           <a:chExt cx="0" cy="0"/>
         </a:xfrm>
       </p:grpSpPr>
+      <p:cxnSp>
+        <p:nvCxnSpPr>
+          <p:cNvPr id="3" name="Google Shape;284;p37">
+            <a:extLst>
+              <a:ext uri="{FF2B5EF4-FFF2-40B4-BE49-F238E27FC236}">
+                <a16:creationId xmlns:a16="http://schemas.microsoft.com/office/drawing/2014/main" id="{9F49BE5A-3FCD-3EA6-693E-A7E946D8F82A}"/>
+              </a:ext>
+            </a:extLst>
+          </p:cNvPr>
+          <p:cNvCxnSpPr/>
+          <p:nvPr/>
+        </p:nvCxnSpPr>
+        <p:spPr>
+          <a:xfrm rot="10800000">
+            <a:off x="4347102" y="3552550"/>
+            <a:ext cx="3948600" cy="1033800"/>
+          </a:xfrm>
+          <a:prstGeom prst="straightConnector1">
+            <a:avLst/>
+          </a:prstGeom>
+          <a:noFill/>
+          <a:ln w="9525" cap="flat" cmpd="sng">
+            <a:solidFill>
+              <a:schemeClr val="dk1"/>
+            </a:solidFill>
+            <a:prstDash val="solid"/>
+            <a:round/>
+            <a:headEnd type="none" w="med" len="med"/>
+            <a:tailEnd type="none" w="med" len="med"/>
+          </a:ln>
+        </p:spPr>
+      </p:cxnSp>
       <p:sp>
         <p:nvSpPr>
           <p:cNvPr id="285" name="Google Shape;285;p37"/>
@@ -13314,120 +13947,6 @@
               <a:t>Github</a:t>
             </a:r>
             <a:endParaRPr dirty="0"/>
-          </a:p>
-        </p:txBody>
-      </p:sp>
-      <p:sp>
-        <p:nvSpPr>
-          <p:cNvPr id="288" name="Google Shape;288;p37"/>
-          <p:cNvSpPr txBox="1">
-            <a:spLocks noGrp="1"/>
-          </p:cNvSpPr>
-          <p:nvPr>
-            <p:ph type="subTitle" idx="1"/>
-          </p:nvPr>
-        </p:nvSpPr>
-        <p:spPr>
-          <a:xfrm>
-            <a:off x="4948752" y="3671888"/>
-            <a:ext cx="2745300" cy="1033800"/>
-          </a:xfrm>
-          <a:prstGeom prst="rect">
-            <a:avLst/>
-          </a:prstGeom>
-          <a:noFill/>
-        </p:spPr>
-        <p:txBody>
-          <a:bodyPr spcFirstLastPara="1" wrap="square" lIns="91425" tIns="91425" rIns="91425" bIns="91425" anchor="ctr" anchorCtr="0">
-            <a:noAutofit/>
-          </a:bodyPr>
-          <a:lstStyle/>
-          <a:p>
-            <a:pPr marL="285750" lvl="0" indent="-285750" algn="l" rtl="0">
-              <a:spcBef>
-                <a:spcPts val="0"/>
-              </a:spcBef>
-              <a:spcAft>
-                <a:spcPts val="0"/>
-              </a:spcAft>
-              <a:buFont typeface="Arial" panose="020B0604020202020204" pitchFamily="34" charset="0"/>
-              <a:buChar char="•"/>
-            </a:pPr>
-            <a:endParaRPr lang="hu-HU" dirty="0"/>
-          </a:p>
-          <a:p>
-            <a:pPr marL="285750" lvl="0" indent="-285750" algn="l" rtl="0">
-              <a:spcBef>
-                <a:spcPts val="0"/>
-              </a:spcBef>
-              <a:spcAft>
-                <a:spcPts val="0"/>
-              </a:spcAft>
-              <a:buFont typeface="Arial" panose="020B0604020202020204" pitchFamily="34" charset="0"/>
-              <a:buChar char="•"/>
-            </a:pPr>
-            <a:r>
-              <a:rPr lang="hu-HU" dirty="0"/>
-              <a:t>Verziókezelés</a:t>
-            </a:r>
-          </a:p>
-          <a:p>
-            <a:pPr marL="285750" lvl="0" indent="-285750" algn="l" rtl="0">
-              <a:spcBef>
-                <a:spcPts val="0"/>
-              </a:spcBef>
-              <a:spcAft>
-                <a:spcPts val="0"/>
-              </a:spcAft>
-              <a:buFont typeface="Arial" panose="020B0604020202020204" pitchFamily="34" charset="0"/>
-              <a:buChar char="•"/>
-            </a:pPr>
-            <a:r>
-              <a:rPr lang="hu-HU" dirty="0"/>
-              <a:t>Munkamegosztás</a:t>
-            </a:r>
-          </a:p>
-          <a:p>
-            <a:pPr marL="285750" lvl="0" indent="-285750" algn="l" rtl="0">
-              <a:spcBef>
-                <a:spcPts val="0"/>
-              </a:spcBef>
-              <a:spcAft>
-                <a:spcPts val="0"/>
-              </a:spcAft>
-              <a:buFont typeface="Arial" panose="020B0604020202020204" pitchFamily="34" charset="0"/>
-              <a:buChar char="•"/>
-            </a:pPr>
-            <a:r>
-              <a:rPr lang="hu-HU" dirty="0"/>
-              <a:t>Címkék</a:t>
-            </a:r>
-          </a:p>
-          <a:p>
-            <a:pPr marL="285750" lvl="0" indent="-285750" algn="l" rtl="0">
-              <a:spcBef>
-                <a:spcPts val="0"/>
-              </a:spcBef>
-              <a:spcAft>
-                <a:spcPts val="0"/>
-              </a:spcAft>
-              <a:buFont typeface="Arial" panose="020B0604020202020204" pitchFamily="34" charset="0"/>
-              <a:buChar char="•"/>
-            </a:pPr>
-            <a:endParaRPr lang="hu-HU" dirty="0"/>
-          </a:p>
-          <a:p>
-            <a:pPr marL="285750" lvl="0" indent="-285750" algn="l" rtl="0">
-              <a:spcBef>
-                <a:spcPts val="0"/>
-              </a:spcBef>
-              <a:spcAft>
-                <a:spcPts val="0"/>
-              </a:spcAft>
-              <a:buFont typeface="Arial" panose="020B0604020202020204" pitchFamily="34" charset="0"/>
-              <a:buChar char="•"/>
-            </a:pPr>
-            <a:endParaRPr lang="hu-HU" dirty="0"/>
           </a:p>
         </p:txBody>
       </p:sp>
@@ -13530,6 +14049,116 @@
           </a:extLst>
         </p:spPr>
       </p:pic>
+      <p:sp>
+        <p:nvSpPr>
+          <p:cNvPr id="288" name="Google Shape;288;p37"/>
+          <p:cNvSpPr txBox="1">
+            <a:spLocks noGrp="1"/>
+          </p:cNvSpPr>
+          <p:nvPr>
+            <p:ph type="subTitle" idx="1"/>
+          </p:nvPr>
+        </p:nvSpPr>
+        <p:spPr>
+          <a:xfrm>
+            <a:off x="5278974" y="3766480"/>
+            <a:ext cx="2084852" cy="801886"/>
+          </a:xfrm>
+          <a:prstGeom prst="rect">
+            <a:avLst/>
+          </a:prstGeom>
+          <a:solidFill>
+            <a:srgbClr val="CB9661"/>
+          </a:solidFill>
+        </p:spPr>
+        <p:txBody>
+          <a:bodyPr spcFirstLastPara="1" wrap="square" lIns="91425" tIns="91425" rIns="91425" bIns="91425" anchor="ctr" anchorCtr="0">
+            <a:noAutofit/>
+          </a:bodyPr>
+          <a:lstStyle/>
+          <a:p>
+            <a:pPr marL="285750" lvl="0" indent="-285750" algn="l" rtl="0">
+              <a:spcBef>
+                <a:spcPts val="0"/>
+              </a:spcBef>
+              <a:spcAft>
+                <a:spcPts val="0"/>
+              </a:spcAft>
+              <a:buFont typeface="Arial" panose="020B0604020202020204" pitchFamily="34" charset="0"/>
+              <a:buChar char="•"/>
+            </a:pPr>
+            <a:endParaRPr lang="hu-HU" dirty="0"/>
+          </a:p>
+          <a:p>
+            <a:pPr marL="0" lvl="0" indent="0" rtl="0">
+              <a:spcBef>
+                <a:spcPts val="0"/>
+              </a:spcBef>
+              <a:spcAft>
+                <a:spcPts val="0"/>
+              </a:spcAft>
+            </a:pPr>
+            <a:r>
+              <a:rPr lang="hu-HU" dirty="0"/>
+              <a:t>Verziókezelés</a:t>
+            </a:r>
+          </a:p>
+          <a:p>
+            <a:pPr marL="0" lvl="0" indent="0" rtl="0">
+              <a:spcBef>
+                <a:spcPts val="0"/>
+              </a:spcBef>
+              <a:spcAft>
+                <a:spcPts val="0"/>
+              </a:spcAft>
+            </a:pPr>
+            <a:r>
+              <a:rPr lang="hu-HU" dirty="0"/>
+              <a:t>Munkamegosztás</a:t>
+            </a:r>
+          </a:p>
+          <a:p>
+            <a:pPr marL="0" lvl="0" indent="0" rtl="0">
+              <a:spcBef>
+                <a:spcPts val="0"/>
+              </a:spcBef>
+              <a:spcAft>
+                <a:spcPts val="0"/>
+              </a:spcAft>
+            </a:pPr>
+            <a:r>
+              <a:rPr lang="hu-HU" dirty="0"/>
+              <a:t>Címkék</a:t>
+            </a:r>
+          </a:p>
+          <a:p>
+            <a:pPr marL="285750" lvl="0" indent="-285750" algn="l" rtl="0">
+              <a:spcBef>
+                <a:spcPts val="0"/>
+              </a:spcBef>
+              <a:spcAft>
+                <a:spcPts val="0"/>
+              </a:spcAft>
+              <a:buFont typeface="Arial" panose="020B0604020202020204" pitchFamily="34" charset="0"/>
+              <a:buChar char="•"/>
+            </a:pPr>
+            <a:endParaRPr lang="hu-HU" dirty="0"/>
+          </a:p>
+          <a:p>
+            <a:pPr marL="285750" lvl="0" indent="-285750" algn="l" rtl="0">
+              <a:spcBef>
+                <a:spcPts val="0"/>
+              </a:spcBef>
+              <a:spcAft>
+                <a:spcPts val="0"/>
+              </a:spcAft>
+              <a:buFont typeface="Arial" panose="020B0604020202020204" pitchFamily="34" charset="0"/>
+              <a:buChar char="•"/>
+            </a:pPr>
+            <a:endParaRPr lang="hu-HU" dirty="0"/>
+          </a:p>
+        </p:txBody>
+      </p:sp>
     </p:spTree>
     <p:extLst>
       <p:ext uri="{BB962C8B-B14F-4D97-AF65-F5344CB8AC3E}">
@@ -13712,22 +14341,14 @@
           <p:nvPr/>
         </p:nvPicPr>
         <p:blipFill>
-          <a:blip r:embed="rId4">
-            <a:extLst>
-              <a:ext uri="{28A0092B-C50C-407E-A947-70E740481C1C}">
-                <a14:useLocalDpi xmlns:a14="http://schemas.microsoft.com/office/drawing/2010/main" val="0"/>
-              </a:ext>
-            </a:extLst>
-          </a:blip>
+          <a:blip r:embed="rId4"/>
           <a:srcRect/>
-          <a:stretch>
-            <a:fillRect/>
-          </a:stretch>
+          <a:stretch/>
         </p:blipFill>
         <p:spPr bwMode="auto">
           <a:xfrm>
-            <a:off x="323727" y="1441618"/>
-            <a:ext cx="4557365" cy="2855915"/>
+            <a:off x="323727" y="1451950"/>
+            <a:ext cx="4557365" cy="2835250"/>
           </a:xfrm>
           <a:prstGeom prst="rect">
             <a:avLst/>
@@ -15821,7 +16442,7 @@
         </p:nvSpPr>
         <p:spPr>
           <a:xfrm>
-            <a:off x="4948752" y="3786389"/>
+            <a:off x="5128962" y="3811194"/>
             <a:ext cx="2745300" cy="423067"/>
           </a:xfrm>
           <a:prstGeom prst="rect">
@@ -15837,26 +16458,13 @@
           </a:bodyPr>
           <a:lstStyle/>
           <a:p>
-            <a:pPr marL="0" lvl="0" indent="0" algn="l" rtl="0">
-              <a:spcBef>
-                <a:spcPts val="0"/>
-              </a:spcBef>
-              <a:spcAft>
-                <a:spcPts val="0"/>
-              </a:spcAft>
-            </a:pPr>
-            <a:endParaRPr lang="hu-HU" dirty="0"/>
-          </a:p>
-          <a:p>
-            <a:pPr marL="285750" lvl="0" indent="-285750" algn="l" rtl="0">
-              <a:spcBef>
-                <a:spcPts val="0"/>
-              </a:spcBef>
-              <a:spcAft>
-                <a:spcPts val="0"/>
-              </a:spcAft>
-              <a:buFont typeface="Arial" panose="020B0604020202020204" pitchFamily="34" charset="0"/>
-              <a:buChar char="•"/>
+            <a:pPr marL="0" lvl="0" indent="0" rtl="0">
+              <a:spcBef>
+                <a:spcPts val="0"/>
+              </a:spcBef>
+              <a:spcAft>
+                <a:spcPts val="0"/>
+              </a:spcAft>
             </a:pPr>
             <a:r>
               <a:rPr lang="hu-HU" dirty="0"/>
@@ -15983,32 +16591,6 @@
           <a:chExt cx="0" cy="0"/>
         </a:xfrm>
       </p:grpSpPr>
-      <p:cxnSp>
-        <p:nvCxnSpPr>
-          <p:cNvPr id="284" name="Google Shape;284;p37"/>
-          <p:cNvCxnSpPr/>
-          <p:nvPr/>
-        </p:nvCxnSpPr>
-        <p:spPr>
-          <a:xfrm rot="10800000">
-            <a:off x="4347102" y="3552550"/>
-            <a:ext cx="3948600" cy="1033800"/>
-          </a:xfrm>
-          <a:prstGeom prst="straightConnector1">
-            <a:avLst/>
-          </a:prstGeom>
-          <a:noFill/>
-          <a:ln w="9525" cap="flat" cmpd="sng">
-            <a:solidFill>
-              <a:schemeClr val="dk1"/>
-            </a:solidFill>
-            <a:prstDash val="solid"/>
-            <a:round/>
-            <a:headEnd type="none" w="med" len="med"/>
-            <a:tailEnd type="none" w="med" len="med"/>
-          </a:ln>
-        </p:spPr>
-      </p:cxnSp>
       <p:sp>
         <p:nvSpPr>
           <p:cNvPr id="286" name="Google Shape;286;p37"/>
@@ -16304,7 +16886,7 @@
                 <a:ea typeface="Verdana" panose="020B0604030504040204" pitchFamily="34" charset="0"/>
                 <a:cs typeface="Poppins" panose="00000500000000000000" pitchFamily="2" charset="-18"/>
               </a:rPr>
-              <a:t>Javasript</a:t>
+              <a:t>Javascript</a:t>
             </a:r>
             <a:endParaRPr b="1" dirty="0">
               <a:latin typeface="Poppins" panose="00000500000000000000" pitchFamily="2" charset="-18"/>
@@ -16446,7 +17028,6 @@
             <a:headEnd type="none" w="sm" len="sm"/>
             <a:tailEnd type="none" w="sm" len="sm"/>
           </a:ln>
-          <a:extLst/>
         </p:spPr>
         <p:txBody>
           <a:bodyPr spcFirstLastPara="1" wrap="square" lIns="91425" tIns="91425" rIns="91425" bIns="91425" anchor="ctr" anchorCtr="0">
@@ -16494,7 +17075,6 @@
             <a:headEnd type="none" w="sm" len="sm"/>
             <a:tailEnd type="none" w="sm" len="sm"/>
           </a:ln>
-          <a:extLst/>
         </p:spPr>
         <p:txBody>
           <a:bodyPr spcFirstLastPara="1" wrap="square" lIns="91425" tIns="91425" rIns="91425" bIns="91425" anchor="ctr" anchorCtr="0">
@@ -17314,8 +17894,8 @@
         </p:nvSpPr>
         <p:spPr>
           <a:xfrm>
-            <a:off x="4948752" y="3697549"/>
-            <a:ext cx="2745300" cy="735900"/>
+            <a:off x="5694524" y="3742492"/>
+            <a:ext cx="1465397" cy="653916"/>
           </a:xfrm>
           <a:prstGeom prst="rect">
             <a:avLst/>
@@ -17330,15 +17910,13 @@
           </a:bodyPr>
           <a:lstStyle/>
           <a:p>
-            <a:pPr marL="285750" lvl="0" indent="-285750" algn="l" rtl="0">
-              <a:spcBef>
-                <a:spcPts val="0"/>
-              </a:spcBef>
-              <a:spcAft>
-                <a:spcPts val="0"/>
-              </a:spcAft>
-              <a:buFont typeface="Arial" panose="020B0604020202020204" pitchFamily="34" charset="0"/>
-              <a:buChar char="•"/>
+            <a:pPr marL="0" lvl="0" indent="0" rtl="0">
+              <a:spcBef>
+                <a:spcPts val="0"/>
+              </a:spcBef>
+              <a:spcAft>
+                <a:spcPts val="0"/>
+              </a:spcAft>
             </a:pPr>
             <a:r>
               <a:rPr lang="hu-HU" dirty="0"/>
@@ -17346,15 +17924,13 @@
             </a:r>
           </a:p>
           <a:p>
-            <a:pPr marL="285750" lvl="0" indent="-285750" algn="l" rtl="0">
-              <a:spcBef>
-                <a:spcPts val="0"/>
-              </a:spcBef>
-              <a:spcAft>
-                <a:spcPts val="0"/>
-              </a:spcAft>
-              <a:buFont typeface="Arial" panose="020B0604020202020204" pitchFamily="34" charset="0"/>
-              <a:buChar char="•"/>
+            <a:pPr marL="0" lvl="0" indent="0" rtl="0">
+              <a:spcBef>
+                <a:spcPts val="0"/>
+              </a:spcBef>
+              <a:spcAft>
+                <a:spcPts val="0"/>
+              </a:spcAft>
             </a:pPr>
             <a:r>
               <a:rPr lang="hu-HU" dirty="0"/>
@@ -18214,8 +18790,8 @@
         </p:nvSpPr>
         <p:spPr>
           <a:xfrm>
-            <a:off x="4948752" y="3697549"/>
-            <a:ext cx="2745300" cy="735900"/>
+            <a:off x="5548180" y="3771630"/>
+            <a:ext cx="1485420" cy="595639"/>
           </a:xfrm>
           <a:prstGeom prst="rect">
             <a:avLst/>
@@ -18230,15 +18806,13 @@
           </a:bodyPr>
           <a:lstStyle/>
           <a:p>
-            <a:pPr marL="285750" lvl="0" indent="-285750" algn="l" rtl="0">
-              <a:spcBef>
-                <a:spcPts val="0"/>
-              </a:spcBef>
-              <a:spcAft>
-                <a:spcPts val="0"/>
-              </a:spcAft>
-              <a:buFont typeface="Arial" panose="020B0604020202020204" pitchFamily="34" charset="0"/>
-              <a:buChar char="•"/>
+            <a:pPr marL="0" lvl="0" indent="0" rtl="0">
+              <a:spcBef>
+                <a:spcPts val="0"/>
+              </a:spcBef>
+              <a:spcAft>
+                <a:spcPts val="0"/>
+              </a:spcAft>
             </a:pPr>
             <a:r>
               <a:rPr lang="hu-HU" dirty="0"/>
@@ -18246,15 +18820,13 @@
             </a:r>
           </a:p>
           <a:p>
-            <a:pPr marL="285750" lvl="0" indent="-285750" algn="l" rtl="0">
-              <a:spcBef>
-                <a:spcPts val="0"/>
-              </a:spcBef>
-              <a:spcAft>
-                <a:spcPts val="0"/>
-              </a:spcAft>
-              <a:buFont typeface="Arial" panose="020B0604020202020204" pitchFamily="34" charset="0"/>
-              <a:buChar char="•"/>
+            <a:pPr marL="0" lvl="0" indent="0" rtl="0">
+              <a:spcBef>
+                <a:spcPts val="0"/>
+              </a:spcBef>
+              <a:spcAft>
+                <a:spcPts val="0"/>
+              </a:spcAft>
             </a:pPr>
             <a:r>
               <a:rPr lang="hu-HU" dirty="0"/>

</xml_diff>